<commit_message>
updated with robot inventor
</commit_message>
<xml_diff>
--- a/en/ProgrammingLessons/ColorSensor.pptx
+++ b/en/ProgrammingLessons/ColorSensor.pptx
@@ -2,7 +2,7 @@
 <file path=ppt/presentation.xml><?xml version="1.0" encoding="utf-8"?>
 <p:presentation xmlns:a="http://schemas.openxmlformats.org/drawingml/2006/main" xmlns:r="http://schemas.openxmlformats.org/officeDocument/2006/relationships" xmlns:p="http://schemas.openxmlformats.org/presentationml/2006/main" showSpecialPlsOnTitleSld="0" saveSubsetFonts="1" autoCompressPictures="0">
   <p:sldMasterIdLst>
-    <p:sldMasterId id="2147483761" r:id="rId1"/>
+    <p:sldMasterId id="2147483773" r:id="rId1"/>
   </p:sldMasterIdLst>
   <p:notesMasterIdLst>
     <p:notesMasterId r:id="rId11"/>
@@ -219,7 +219,7 @@
           <a:p>
             <a:fld id="{58040048-1E4D-CD41-AC49-0750EB72586B}" type="datetimeFigureOut">
               <a:rPr lang="en-US" smtClean="0"/>
-              <a:t>6/9/2020</a:t>
+              <a:t>12/16/20</a:t>
             </a:fld>
             <a:endParaRPr lang="en-US"/>
           </a:p>
@@ -385,7 +385,7 @@
           <a:p>
             <a:fld id="{2B8484CF-5098-F24E-8881-583515D5C406}" type="datetimeFigureOut">
               <a:rPr lang="en-US" smtClean="0"/>
-              <a:t>6/9/2020</a:t>
+              <a:t>12/16/20</a:t>
             </a:fld>
             <a:endParaRPr lang="en-US"/>
           </a:p>
@@ -678,7 +678,7 @@
         </p:nvSpPr>
         <p:spPr>
           <a:xfrm>
-            <a:off x="182241" y="2203290"/>
+            <a:off x="182241" y="2579003"/>
             <a:ext cx="8787652" cy="2468585"/>
           </a:xfrm>
           <a:prstGeom prst="rect">
@@ -719,8 +719,8 @@
         </p:nvSpPr>
         <p:spPr>
           <a:xfrm>
-            <a:off x="242754" y="2300865"/>
-            <a:ext cx="5815852" cy="1504844"/>
+            <a:off x="242754" y="2676578"/>
+            <a:ext cx="8528356" cy="1504844"/>
           </a:xfrm>
           <a:effectLst/>
         </p:spPr>
@@ -738,7 +738,10 @@
             </a:lvl1pPr>
           </a:lstStyle>
           <a:p>
-            <a:endParaRPr lang="en-US" dirty="0"/>
+            <a:r>
+              <a:rPr lang="en-US" dirty="0"/>
+              <a:t>Click to edit Master title style</a:t>
+            </a:r>
           </a:p>
         </p:txBody>
       </p:sp>
@@ -754,7 +757,7 @@
         </p:nvSpPr>
         <p:spPr>
           <a:xfrm>
-            <a:off x="316712" y="3800535"/>
+            <a:off x="316712" y="4176248"/>
             <a:ext cx="5741894" cy="590321"/>
           </a:xfrm>
         </p:spPr>
@@ -767,7 +770,7 @@
               <a:buNone/>
               <a:defRPr sz="1600" cap="all">
                 <a:solidFill>
-                  <a:schemeClr val="accent2"/>
+                  <a:srgbClr val="0EAE9F"/>
                 </a:solidFill>
               </a:defRPr>
             </a:lvl1pPr>
@@ -872,7 +875,7 @@
           <p:cNvSpPr txBox="1">
             <a:spLocks/>
           </p:cNvSpPr>
-          <p:nvPr userDrawn="1"/>
+          <p:nvPr/>
         </p:nvSpPr>
         <p:spPr>
           <a:xfrm>
@@ -1093,51 +1096,11 @@
             </a:pPr>
             <a:r>
               <a:rPr lang="en-US" sz="3200" dirty="0"/>
-              <a:t>SPIKE PRIME LESSONS</a:t>
-            </a:r>
-          </a:p>
-        </p:txBody>
-      </p:sp>
-      <p:pic>
-        <p:nvPicPr>
-          <p:cNvPr id="9" name="Picture 8" descr="A picture containing drawing&#10;&#10;Description automatically generated">
-            <a:extLst>
-              <a:ext uri="{FF2B5EF4-FFF2-40B4-BE49-F238E27FC236}">
-                <a16:creationId xmlns:a16="http://schemas.microsoft.com/office/drawing/2014/main" id="{26780A6E-BC42-443E-B6EE-CF18D754C376}"/>
-              </a:ext>
-            </a:extLst>
-          </p:cNvPr>
-          <p:cNvPicPr>
-            <a:picLocks noChangeAspect="1"/>
-          </p:cNvPicPr>
-          <p:nvPr userDrawn="1"/>
-        </p:nvPicPr>
-        <p:blipFill rotWithShape="1">
-          <a:blip r:embed="rId2">
-            <a:clrChange>
-              <a:clrFrom>
-                <a:srgbClr val="000000"/>
-              </a:clrFrom>
-              <a:clrTo>
-                <a:srgbClr val="000000">
-                  <a:alpha val="0"/>
-                </a:srgbClr>
-              </a:clrTo>
-            </a:clrChange>
-          </a:blip>
-          <a:srcRect b="32885"/>
-          <a:stretch/>
-        </p:blipFill>
-        <p:spPr>
-          <a:xfrm>
-            <a:off x="179837" y="1052244"/>
-            <a:ext cx="1668346" cy="1119706"/>
-          </a:xfrm>
-          <a:prstGeom prst="rect">
-            <a:avLst/>
-          </a:prstGeom>
-        </p:spPr>
-      </p:pic>
+              <a:t>PRIME LESSONS</a:t>
+            </a:r>
+          </a:p>
+        </p:txBody>
+      </p:sp>
       <p:sp>
         <p:nvSpPr>
           <p:cNvPr id="11" name="TextBox 10">
@@ -1148,12 +1111,12 @@
             </a:extLst>
           </p:cNvPr>
           <p:cNvSpPr txBox="1"/>
-          <p:nvPr userDrawn="1"/>
-        </p:nvSpPr>
-        <p:spPr>
-          <a:xfrm>
-            <a:off x="6058605" y="737053"/>
-            <a:ext cx="2911288" cy="584775"/>
+          <p:nvPr/>
+        </p:nvSpPr>
+        <p:spPr>
+          <a:xfrm>
+            <a:off x="6331000" y="685891"/>
+            <a:ext cx="2440110" cy="307777"/>
           </a:xfrm>
           <a:prstGeom prst="rect">
             <a:avLst/>
@@ -1166,7 +1129,7 @@
           </a:bodyPr>
           <a:lstStyle/>
           <a:p>
-            <a:pPr marL="0" marR="0" lvl="0" indent="0" algn="l" defTabSz="914400" rtl="0" eaLnBrk="1" fontAlgn="auto" latinLnBrk="0" hangingPunct="1">
+            <a:pPr marL="0" marR="0" lvl="0" indent="0" algn="ctr" defTabSz="914400" rtl="0" eaLnBrk="1" fontAlgn="auto" latinLnBrk="0" hangingPunct="1">
               <a:lnSpc>
                 <a:spcPct val="100000"/>
               </a:lnSpc>
@@ -1184,191 +1147,314 @@
               <a:defRPr/>
             </a:pPr>
             <a:r>
-              <a:rPr lang="en-US" sz="1600" dirty="0"/>
-              <a:t>By the Creators of EV3Lessons</a:t>
-            </a:r>
-          </a:p>
-          <a:p>
-            <a:endParaRPr lang="en-US" sz="1600" dirty="0"/>
+              <a:rPr lang="en-US" sz="1400" dirty="0"/>
+              <a:t>By the Makers of EV3Lessons</a:t>
+            </a:r>
           </a:p>
         </p:txBody>
       </p:sp>
       <p:pic>
         <p:nvPicPr>
-          <p:cNvPr id="12" name="Picture 11" descr="A picture containing sitting, game, remote, video&#10;&#10;Description automatically generated">
+          <p:cNvPr id="18" name="Picture 17" descr="A picture containing application&#10;&#10;Description automatically generated">
             <a:extLst>
               <a:ext uri="{FF2B5EF4-FFF2-40B4-BE49-F238E27FC236}">
-                <a16:creationId xmlns:a16="http://schemas.microsoft.com/office/drawing/2014/main" id="{19D0660C-C674-40CA-9A39-C1E73533C99D}"/>
+                <a16:creationId xmlns:a16="http://schemas.microsoft.com/office/drawing/2014/main" id="{69DF8FC2-9ED1-BB44-8E96-5B069F6C6497}"/>
               </a:ext>
             </a:extLst>
           </p:cNvPr>
           <p:cNvPicPr>
             <a:picLocks noChangeAspect="1"/>
           </p:cNvPicPr>
-          <p:nvPr userDrawn="1"/>
+          <p:nvPr/>
         </p:nvPicPr>
-        <p:blipFill rotWithShape="1">
-          <a:blip r:embed="rId3">
-            <a:alphaModFix/>
-          </a:blip>
-          <a:srcRect l="24583" t="2888" r="29917" b="4667"/>
-          <a:stretch/>
+        <p:blipFill>
+          <a:blip r:embed="rId2"/>
+          <a:stretch>
+            <a:fillRect/>
+          </a:stretch>
         </p:blipFill>
         <p:spPr>
           <a:xfrm>
-            <a:off x="6058605" y="1349909"/>
-            <a:ext cx="2672408" cy="4072241"/>
+            <a:off x="7612649" y="993668"/>
+            <a:ext cx="1158461" cy="1158461"/>
           </a:xfrm>
           <a:prstGeom prst="rect">
             <a:avLst/>
           </a:prstGeom>
         </p:spPr>
       </p:pic>
-      <p:grpSp>
-        <p:nvGrpSpPr>
-          <p:cNvPr id="10" name="Group 9">
+      <p:pic>
+        <p:nvPicPr>
+          <p:cNvPr id="19" name="Picture 18" descr="Shape, square&#10;&#10;Description automatically generated">
             <a:extLst>
               <a:ext uri="{FF2B5EF4-FFF2-40B4-BE49-F238E27FC236}">
-                <a16:creationId xmlns:a16="http://schemas.microsoft.com/office/drawing/2014/main" id="{4B69029F-0264-491E-B811-65F7DA3CBBB0}"/>
+                <a16:creationId xmlns:a16="http://schemas.microsoft.com/office/drawing/2014/main" id="{2D46D815-081F-064A-AFA6-098A6E7A3DD2}"/>
               </a:ext>
             </a:extLst>
           </p:cNvPr>
-          <p:cNvGrpSpPr/>
+          <p:cNvPicPr>
+            <a:picLocks noChangeAspect="1"/>
+          </p:cNvPicPr>
+          <p:nvPr/>
+        </p:nvPicPr>
+        <p:blipFill>
+          <a:blip r:embed="rId3"/>
+          <a:stretch>
+            <a:fillRect/>
+          </a:stretch>
+        </p:blipFill>
+        <p:spPr>
+          <a:xfrm>
+            <a:off x="6399647" y="993669"/>
+            <a:ext cx="1158461" cy="1158461"/>
+          </a:xfrm>
+          <a:prstGeom prst="rect">
+            <a:avLst/>
+          </a:prstGeom>
+        </p:spPr>
+      </p:pic>
+      <p:sp>
+        <p:nvSpPr>
+          <p:cNvPr id="9" name="Subtitle 1">
+            <a:extLst>
+              <a:ext uri="{FF2B5EF4-FFF2-40B4-BE49-F238E27FC236}">
+                <a16:creationId xmlns:a16="http://schemas.microsoft.com/office/drawing/2014/main" id="{0033297F-2FA6-5044-8D25-02645BFA76EA}"/>
+              </a:ext>
+            </a:extLst>
+          </p:cNvPr>
+          <p:cNvSpPr txBox="1">
+            <a:spLocks/>
+          </p:cNvSpPr>
           <p:nvPr userDrawn="1"/>
-        </p:nvGrpSpPr>
-        <p:grpSpPr>
-          <a:xfrm>
-            <a:off x="179837" y="5060305"/>
-            <a:ext cx="4773538" cy="1188622"/>
-            <a:chOff x="131592" y="5034964"/>
-            <a:chExt cx="4773538" cy="1188622"/>
-          </a:xfrm>
-        </p:grpSpPr>
-        <p:pic>
-          <p:nvPicPr>
-            <p:cNvPr id="13" name="Picture 12" descr="A picture containing drawing, window&#10;&#10;Description automatically generated">
-              <a:extLst>
-                <a:ext uri="{FF2B5EF4-FFF2-40B4-BE49-F238E27FC236}">
-                  <a16:creationId xmlns:a16="http://schemas.microsoft.com/office/drawing/2014/main" id="{ABD06244-04F9-463D-A4DB-628C04BB8546}"/>
-                </a:ext>
-              </a:extLst>
-            </p:cNvPr>
-            <p:cNvPicPr>
-              <a:picLocks noChangeAspect="1"/>
-            </p:cNvPicPr>
-            <p:nvPr userDrawn="1"/>
-          </p:nvPicPr>
-          <p:blipFill>
-            <a:blip r:embed="rId4"/>
-            <a:stretch>
-              <a:fillRect/>
-            </a:stretch>
-          </p:blipFill>
-          <p:spPr>
-            <a:xfrm>
-              <a:off x="1326564" y="5034964"/>
-              <a:ext cx="1188622" cy="1188622"/>
-            </a:xfrm>
-            <a:prstGeom prst="rect">
-              <a:avLst/>
-            </a:prstGeom>
-          </p:spPr>
-        </p:pic>
-        <p:pic>
-          <p:nvPicPr>
-            <p:cNvPr id="14" name="Picture 13" descr="A picture containing building, drawing&#10;&#10;Description automatically generated">
-              <a:extLst>
-                <a:ext uri="{FF2B5EF4-FFF2-40B4-BE49-F238E27FC236}">
-                  <a16:creationId xmlns:a16="http://schemas.microsoft.com/office/drawing/2014/main" id="{63D75727-DAE8-4F50-8B40-C2AB0C6A949F}"/>
-                </a:ext>
-              </a:extLst>
-            </p:cNvPr>
-            <p:cNvPicPr>
-              <a:picLocks noChangeAspect="1"/>
-            </p:cNvPicPr>
-            <p:nvPr userDrawn="1"/>
-          </p:nvPicPr>
-          <p:blipFill>
-            <a:blip r:embed="rId5"/>
-            <a:stretch>
-              <a:fillRect/>
-            </a:stretch>
-          </p:blipFill>
-          <p:spPr>
-            <a:xfrm>
-              <a:off x="131592" y="5034964"/>
-              <a:ext cx="1188622" cy="1188622"/>
-            </a:xfrm>
-            <a:prstGeom prst="rect">
-              <a:avLst/>
-            </a:prstGeom>
-          </p:spPr>
-        </p:pic>
-        <p:pic>
-          <p:nvPicPr>
-            <p:cNvPr id="15" name="Picture 14" descr="A picture containing drawing, holding&#10;&#10;Description automatically generated">
-              <a:extLst>
-                <a:ext uri="{FF2B5EF4-FFF2-40B4-BE49-F238E27FC236}">
-                  <a16:creationId xmlns:a16="http://schemas.microsoft.com/office/drawing/2014/main" id="{65AA8D01-3E12-417C-866C-09E77342F6AA}"/>
-                </a:ext>
-              </a:extLst>
-            </p:cNvPr>
-            <p:cNvPicPr>
-              <a:picLocks noChangeAspect="1"/>
-            </p:cNvPicPr>
-            <p:nvPr userDrawn="1"/>
-          </p:nvPicPr>
-          <p:blipFill>
-            <a:blip r:embed="rId6"/>
-            <a:stretch>
-              <a:fillRect/>
-            </a:stretch>
-          </p:blipFill>
-          <p:spPr>
-            <a:xfrm>
-              <a:off x="3716508" y="5034964"/>
-              <a:ext cx="1188622" cy="1188622"/>
-            </a:xfrm>
-            <a:prstGeom prst="rect">
-              <a:avLst/>
-            </a:prstGeom>
-          </p:spPr>
-        </p:pic>
-        <p:pic>
-          <p:nvPicPr>
-            <p:cNvPr id="16" name="Picture 15" descr="A picture containing drawing, building, purple, window&#10;&#10;Description automatically generated">
-              <a:extLst>
-                <a:ext uri="{FF2B5EF4-FFF2-40B4-BE49-F238E27FC236}">
-                  <a16:creationId xmlns:a16="http://schemas.microsoft.com/office/drawing/2014/main" id="{BA4509F5-9711-4A35-B736-E2BAFCB547F0}"/>
-                </a:ext>
-              </a:extLst>
-            </p:cNvPr>
-            <p:cNvPicPr>
-              <a:picLocks noChangeAspect="1"/>
-            </p:cNvPicPr>
-            <p:nvPr userDrawn="1"/>
-          </p:nvPicPr>
-          <p:blipFill>
-            <a:blip r:embed="rId7"/>
-            <a:stretch>
-              <a:fillRect/>
-            </a:stretch>
-          </p:blipFill>
-          <p:spPr>
-            <a:xfrm>
-              <a:off x="2521536" y="5034964"/>
-              <a:ext cx="1188622" cy="1188622"/>
-            </a:xfrm>
-            <a:prstGeom prst="rect">
-              <a:avLst/>
-            </a:prstGeom>
-          </p:spPr>
-        </p:pic>
-      </p:grpSp>
+        </p:nvSpPr>
+        <p:spPr>
+          <a:xfrm>
+            <a:off x="4808377" y="357846"/>
+            <a:ext cx="4161516" cy="509489"/>
+          </a:xfrm>
+          <a:prstGeom prst="rect">
+            <a:avLst/>
+          </a:prstGeom>
+        </p:spPr>
+        <p:txBody>
+          <a:bodyPr vert="horz" lIns="91440" tIns="45720" rIns="91440" bIns="45720" rtlCol="0" anchor="t">
+            <a:normAutofit fontScale="92500" lnSpcReduction="10000"/>
+          </a:bodyPr>
+          <a:lstStyle>
+            <a:lvl1pPr marL="306000" indent="-306000" algn="l" defTabSz="457200" rtl="0" eaLnBrk="1" latinLnBrk="0" hangingPunct="1">
+              <a:spcBef>
+                <a:spcPct val="20000"/>
+              </a:spcBef>
+              <a:spcAft>
+                <a:spcPts val="600"/>
+              </a:spcAft>
+              <a:buClr>
+                <a:schemeClr val="accent2"/>
+              </a:buClr>
+              <a:buSzPct val="92000"/>
+              <a:buFont typeface="Wingdings 2" charset="2"/>
+              <a:buChar char=""/>
+              <a:defRPr sz="1800" kern="1200">
+                <a:solidFill>
+                  <a:schemeClr val="tx2"/>
+                </a:solidFill>
+                <a:latin typeface="+mn-lt"/>
+                <a:ea typeface="+mn-ea"/>
+                <a:cs typeface="+mn-cs"/>
+              </a:defRPr>
+            </a:lvl1pPr>
+            <a:lvl2pPr marL="630000" indent="-306000" algn="l" defTabSz="457200" rtl="0" eaLnBrk="1" latinLnBrk="0" hangingPunct="1">
+              <a:spcBef>
+                <a:spcPct val="20000"/>
+              </a:spcBef>
+              <a:spcAft>
+                <a:spcPts val="600"/>
+              </a:spcAft>
+              <a:buClr>
+                <a:schemeClr val="accent2"/>
+              </a:buClr>
+              <a:buSzPct val="92000"/>
+              <a:buFont typeface="Wingdings 2" charset="2"/>
+              <a:buChar char=""/>
+              <a:defRPr sz="1600" kern="1200">
+                <a:solidFill>
+                  <a:schemeClr val="tx2"/>
+                </a:solidFill>
+                <a:latin typeface="+mn-lt"/>
+                <a:ea typeface="+mn-ea"/>
+                <a:cs typeface="+mn-cs"/>
+              </a:defRPr>
+            </a:lvl2pPr>
+            <a:lvl3pPr marL="900000" indent="-270000" algn="l" defTabSz="457200" rtl="0" eaLnBrk="1" latinLnBrk="0" hangingPunct="1">
+              <a:spcBef>
+                <a:spcPct val="20000"/>
+              </a:spcBef>
+              <a:spcAft>
+                <a:spcPts val="600"/>
+              </a:spcAft>
+              <a:buClr>
+                <a:schemeClr val="accent2"/>
+              </a:buClr>
+              <a:buSzPct val="92000"/>
+              <a:buFont typeface="Wingdings 2" charset="2"/>
+              <a:buChar char=""/>
+              <a:defRPr sz="1400" kern="1200">
+                <a:solidFill>
+                  <a:schemeClr val="tx2"/>
+                </a:solidFill>
+                <a:latin typeface="+mn-lt"/>
+                <a:ea typeface="+mn-ea"/>
+                <a:cs typeface="+mn-cs"/>
+              </a:defRPr>
+            </a:lvl3pPr>
+            <a:lvl4pPr marL="1242000" indent="-234000" algn="l" defTabSz="457200" rtl="0" eaLnBrk="1" latinLnBrk="0" hangingPunct="1">
+              <a:spcBef>
+                <a:spcPct val="20000"/>
+              </a:spcBef>
+              <a:spcAft>
+                <a:spcPts val="600"/>
+              </a:spcAft>
+              <a:buClr>
+                <a:schemeClr val="accent2"/>
+              </a:buClr>
+              <a:buSzPct val="92000"/>
+              <a:buFont typeface="Wingdings 2" charset="2"/>
+              <a:buChar char=""/>
+              <a:defRPr sz="1200" kern="1200">
+                <a:solidFill>
+                  <a:schemeClr val="tx2"/>
+                </a:solidFill>
+                <a:latin typeface="+mn-lt"/>
+                <a:ea typeface="+mn-ea"/>
+                <a:cs typeface="+mn-cs"/>
+              </a:defRPr>
+            </a:lvl4pPr>
+            <a:lvl5pPr marL="1602000" indent="-234000" algn="l" defTabSz="457200" rtl="0" eaLnBrk="1" latinLnBrk="0" hangingPunct="1">
+              <a:spcBef>
+                <a:spcPct val="20000"/>
+              </a:spcBef>
+              <a:spcAft>
+                <a:spcPts val="600"/>
+              </a:spcAft>
+              <a:buClr>
+                <a:schemeClr val="accent2"/>
+              </a:buClr>
+              <a:buSzPct val="92000"/>
+              <a:buFont typeface="Wingdings 2" charset="2"/>
+              <a:buChar char=""/>
+              <a:defRPr sz="1200" kern="1200">
+                <a:solidFill>
+                  <a:schemeClr val="tx2"/>
+                </a:solidFill>
+                <a:latin typeface="+mn-lt"/>
+                <a:ea typeface="+mn-ea"/>
+                <a:cs typeface="+mn-cs"/>
+              </a:defRPr>
+            </a:lvl5pPr>
+            <a:lvl6pPr marL="1900000" indent="-228600" algn="l" defTabSz="457200" rtl="0" eaLnBrk="1" latinLnBrk="0" hangingPunct="1">
+              <a:spcBef>
+                <a:spcPct val="20000"/>
+              </a:spcBef>
+              <a:spcAft>
+                <a:spcPts val="600"/>
+              </a:spcAft>
+              <a:buClr>
+                <a:schemeClr val="accent2"/>
+              </a:buClr>
+              <a:buSzPct val="92000"/>
+              <a:buFont typeface="Wingdings 2" charset="2"/>
+              <a:buChar char=""/>
+              <a:defRPr sz="1200" kern="1200">
+                <a:solidFill>
+                  <a:schemeClr val="tx2"/>
+                </a:solidFill>
+                <a:latin typeface="+mn-lt"/>
+                <a:ea typeface="+mn-ea"/>
+                <a:cs typeface="+mn-cs"/>
+              </a:defRPr>
+            </a:lvl6pPr>
+            <a:lvl7pPr marL="2200000" indent="-228600" algn="l" defTabSz="457200" rtl="0" eaLnBrk="1" latinLnBrk="0" hangingPunct="1">
+              <a:spcBef>
+                <a:spcPct val="20000"/>
+              </a:spcBef>
+              <a:spcAft>
+                <a:spcPts val="600"/>
+              </a:spcAft>
+              <a:buClr>
+                <a:schemeClr val="accent2"/>
+              </a:buClr>
+              <a:buSzPct val="92000"/>
+              <a:buFont typeface="Wingdings 2" charset="2"/>
+              <a:buChar char=""/>
+              <a:defRPr sz="1200" kern="1200">
+                <a:solidFill>
+                  <a:schemeClr val="tx2"/>
+                </a:solidFill>
+                <a:latin typeface="+mn-lt"/>
+                <a:ea typeface="+mn-ea"/>
+                <a:cs typeface="+mn-cs"/>
+              </a:defRPr>
+            </a:lvl7pPr>
+            <a:lvl8pPr marL="2500000" indent="-228600" algn="l" defTabSz="457200" rtl="0" eaLnBrk="1" latinLnBrk="0" hangingPunct="1">
+              <a:spcBef>
+                <a:spcPct val="20000"/>
+              </a:spcBef>
+              <a:spcAft>
+                <a:spcPts val="600"/>
+              </a:spcAft>
+              <a:buClr>
+                <a:schemeClr val="accent2"/>
+              </a:buClr>
+              <a:buSzPct val="92000"/>
+              <a:buFont typeface="Wingdings 2" charset="2"/>
+              <a:buChar char=""/>
+              <a:defRPr sz="1200" kern="1200">
+                <a:solidFill>
+                  <a:schemeClr val="tx2"/>
+                </a:solidFill>
+                <a:latin typeface="+mn-lt"/>
+                <a:ea typeface="+mn-ea"/>
+                <a:cs typeface="+mn-cs"/>
+              </a:defRPr>
+            </a:lvl8pPr>
+            <a:lvl9pPr marL="2800000" indent="-228600" algn="l" defTabSz="457200" rtl="0" eaLnBrk="1" latinLnBrk="0" hangingPunct="1">
+              <a:spcBef>
+                <a:spcPct val="20000"/>
+              </a:spcBef>
+              <a:spcAft>
+                <a:spcPts val="600"/>
+              </a:spcAft>
+              <a:buClr>
+                <a:schemeClr val="accent2"/>
+              </a:buClr>
+              <a:buSzPct val="92000"/>
+              <a:buFont typeface="Wingdings 2" panose="05020102010507070707" pitchFamily="18" charset="2"/>
+              <a:buChar char=""/>
+              <a:defRPr sz="1200" kern="1200">
+                <a:solidFill>
+                  <a:schemeClr val="tx2"/>
+                </a:solidFill>
+                <a:latin typeface="+mn-lt"/>
+                <a:ea typeface="+mn-ea"/>
+                <a:cs typeface="+mn-cs"/>
+              </a:defRPr>
+            </a:lvl9pPr>
+          </a:lstStyle>
+          <a:p>
+            <a:pPr marL="0" indent="0" algn="r">
+              <a:buNone/>
+            </a:pPr>
+            <a:r>
+              <a:rPr lang="en-US" sz="3200" dirty="0"/>
+              <a:t>PRIME LESSONS</a:t>
+            </a:r>
+          </a:p>
+        </p:txBody>
+      </p:sp>
     </p:spTree>
     <p:extLst>
       <p:ext uri="{BB962C8B-B14F-4D97-AF65-F5344CB8AC3E}">
-        <p14:creationId xmlns:p14="http://schemas.microsoft.com/office/powerpoint/2010/main" val="2462555266"/>
+        <p14:creationId xmlns:p14="http://schemas.microsoft.com/office/powerpoint/2010/main" val="423387008"/>
       </p:ext>
     </p:extLst>
   </p:cSld>
@@ -1617,7 +1703,7 @@
     </p:spTree>
     <p:extLst>
       <p:ext uri="{BB962C8B-B14F-4D97-AF65-F5344CB8AC3E}">
-        <p14:creationId xmlns:p14="http://schemas.microsoft.com/office/powerpoint/2010/main" val="383043856"/>
+        <p14:creationId xmlns:p14="http://schemas.microsoft.com/office/powerpoint/2010/main" val="4177528963"/>
       </p:ext>
     </p:extLst>
   </p:cSld>
@@ -1882,7 +1968,7 @@
     </p:spTree>
     <p:extLst>
       <p:ext uri="{BB962C8B-B14F-4D97-AF65-F5344CB8AC3E}">
-        <p14:creationId xmlns:p14="http://schemas.microsoft.com/office/powerpoint/2010/main" val="103737683"/>
+        <p14:creationId xmlns:p14="http://schemas.microsoft.com/office/powerpoint/2010/main" val="2095334799"/>
       </p:ext>
     </p:extLst>
   </p:cSld>
@@ -1892,785 +1978,9 @@
 </p:sldLayout>
 </file>
 
-<file path=ppt/slideLayouts/slideLayout2.xml><?xml version="1.0" encoding="utf-8"?>
-<p:sldLayout xmlns:a="http://schemas.openxmlformats.org/drawingml/2006/main" xmlns:r="http://schemas.openxmlformats.org/officeDocument/2006/relationships" xmlns:p="http://schemas.openxmlformats.org/presentationml/2006/main" type="obj" preserve="1">
-  <p:cSld name="Title and Content">
-    <p:spTree>
-      <p:nvGrpSpPr>
-        <p:cNvPr id="1" name=""/>
-        <p:cNvGrpSpPr/>
-        <p:nvPr/>
-      </p:nvGrpSpPr>
-      <p:grpSpPr>
-        <a:xfrm>
-          <a:off x="0" y="0"/>
-          <a:ext cx="0" cy="0"/>
-          <a:chOff x="0" y="0"/>
-          <a:chExt cx="0" cy="0"/>
-        </a:xfrm>
-      </p:grpSpPr>
-      <p:sp>
-        <p:nvSpPr>
-          <p:cNvPr id="7" name="Rectangle 6"/>
-          <p:cNvSpPr>
-            <a:spLocks noChangeAspect="1"/>
-          </p:cNvSpPr>
-          <p:nvPr/>
-        </p:nvSpPr>
-        <p:spPr>
-          <a:xfrm>
-            <a:off x="142200" y="249101"/>
-            <a:ext cx="8831579" cy="840455"/>
-          </a:xfrm>
-          <a:prstGeom prst="rect">
-            <a:avLst/>
-          </a:prstGeom>
-          <a:solidFill>
-            <a:schemeClr val="accent1"/>
-          </a:solidFill>
-          <a:ln>
-            <a:noFill/>
-          </a:ln>
-          <a:effectLst/>
-        </p:spPr>
-        <p:style>
-          <a:lnRef idx="1">
-            <a:schemeClr val="accent1"/>
-          </a:lnRef>
-          <a:fillRef idx="3">
-            <a:schemeClr val="accent1"/>
-          </a:fillRef>
-          <a:effectRef idx="2">
-            <a:schemeClr val="accent1"/>
-          </a:effectRef>
-          <a:fontRef idx="minor">
-            <a:schemeClr val="lt1"/>
-          </a:fontRef>
-        </p:style>
-        <p:txBody>
-          <a:bodyPr/>
-          <a:lstStyle/>
-          <a:p>
-            <a:endParaRPr lang="en-US" dirty="0"/>
-          </a:p>
-        </p:txBody>
-      </p:sp>
-      <p:sp>
-        <p:nvSpPr>
-          <p:cNvPr id="2" name="Title 1"/>
-          <p:cNvSpPr>
-            <a:spLocks noGrp="1"/>
-          </p:cNvSpPr>
-          <p:nvPr>
-            <p:ph type="title"/>
-          </p:nvPr>
-        </p:nvSpPr>
-        <p:spPr>
-          <a:xfrm>
-            <a:off x="175260" y="292975"/>
-            <a:ext cx="8746864" cy="752706"/>
-          </a:xfrm>
-        </p:spPr>
-        <p:txBody>
-          <a:bodyPr anchor="t"/>
-          <a:lstStyle>
-            <a:lvl1pPr>
-              <a:defRPr>
-                <a:solidFill>
-                  <a:schemeClr val="tx1"/>
-                </a:solidFill>
-              </a:defRPr>
-            </a:lvl1pPr>
-          </a:lstStyle>
-          <a:p>
-            <a:r>
-              <a:rPr lang="en-US" dirty="0"/>
-              <a:t>Click to edit Master title style</a:t>
-            </a:r>
-          </a:p>
-        </p:txBody>
-      </p:sp>
-      <p:sp>
-        <p:nvSpPr>
-          <p:cNvPr id="3" name="Content Placeholder 2"/>
-          <p:cNvSpPr>
-            <a:spLocks noGrp="1"/>
-          </p:cNvSpPr>
-          <p:nvPr>
-            <p:ph idx="1"/>
-          </p:nvPr>
-        </p:nvSpPr>
-        <p:spPr>
-          <a:xfrm>
-            <a:off x="155088" y="1140006"/>
-            <a:ext cx="8831580" cy="5082601"/>
-          </a:xfrm>
-        </p:spPr>
-        <p:txBody>
-          <a:bodyPr/>
-          <a:lstStyle/>
-          <a:p>
-            <a:pPr lvl="0"/>
-            <a:r>
-              <a:rPr lang="en-US" dirty="0"/>
-              <a:t>Click to edit Master text styles</a:t>
-            </a:r>
-          </a:p>
-          <a:p>
-            <a:pPr lvl="1"/>
-            <a:r>
-              <a:rPr lang="en-US" dirty="0"/>
-              <a:t>Second level</a:t>
-            </a:r>
-          </a:p>
-          <a:p>
-            <a:pPr lvl="2"/>
-            <a:r>
-              <a:rPr lang="en-US" dirty="0"/>
-              <a:t>Third level</a:t>
-            </a:r>
-          </a:p>
-          <a:p>
-            <a:pPr lvl="3"/>
-            <a:r>
-              <a:rPr lang="en-US" dirty="0"/>
-              <a:t>Fourth level</a:t>
-            </a:r>
-          </a:p>
-          <a:p>
-            <a:pPr lvl="4"/>
-            <a:r>
-              <a:rPr lang="en-US" dirty="0"/>
-              <a:t>Fifth level</a:t>
-            </a:r>
-          </a:p>
-        </p:txBody>
-      </p:sp>
-      <p:sp>
-        <p:nvSpPr>
-          <p:cNvPr id="5" name="Footer Placeholder 4"/>
-          <p:cNvSpPr>
-            <a:spLocks noGrp="1"/>
-          </p:cNvSpPr>
-          <p:nvPr>
-            <p:ph type="ftr" sz="quarter" idx="11"/>
-          </p:nvPr>
-        </p:nvSpPr>
-        <p:spPr>
-          <a:xfrm>
-            <a:off x="88409" y="6321349"/>
-            <a:ext cx="4870585" cy="365125"/>
-          </a:xfrm>
-          <a:prstGeom prst="rect">
-            <a:avLst/>
-          </a:prstGeom>
-        </p:spPr>
-        <p:txBody>
-          <a:bodyPr/>
-          <a:lstStyle>
-            <a:lvl1pPr>
-              <a:defRPr sz="900"/>
-            </a:lvl1pPr>
-          </a:lstStyle>
-          <a:p>
-            <a:r>
-              <a:rPr lang="en-US" dirty="0"/>
-              <a:t>Copyright © 2020 SPIKE Prime Lessons (primelessons.org) CC-BY-NC-SA.  (Last edit: 1/9/2020)</a:t>
-            </a:r>
-          </a:p>
-        </p:txBody>
-      </p:sp>
-      <p:sp>
-        <p:nvSpPr>
-          <p:cNvPr id="6" name="Slide Number Placeholder 5"/>
-          <p:cNvSpPr>
-            <a:spLocks noGrp="1"/>
-          </p:cNvSpPr>
-          <p:nvPr>
-            <p:ph type="sldNum" sz="quarter" idx="12"/>
-          </p:nvPr>
-        </p:nvSpPr>
-        <p:spPr>
-          <a:xfrm>
-            <a:off x="8236372" y="6317217"/>
-            <a:ext cx="770468" cy="365125"/>
-          </a:xfrm>
-          <a:prstGeom prst="rect">
-            <a:avLst/>
-          </a:prstGeom>
-        </p:spPr>
-        <p:txBody>
-          <a:bodyPr/>
-          <a:lstStyle/>
-          <a:p>
-            <a:fld id="{BBD74847-7BE4-4E4D-8159-51DF7B93C616}" type="slidenum">
-              <a:rPr lang="en-US" smtClean="0"/>
-              <a:t>‹#›</a:t>
-            </a:fld>
-            <a:endParaRPr lang="en-US"/>
-          </a:p>
-        </p:txBody>
-      </p:sp>
-      <p:cxnSp>
-        <p:nvCxnSpPr>
-          <p:cNvPr id="9" name="Straight Connector 8">
-            <a:extLst>
-              <a:ext uri="{FF2B5EF4-FFF2-40B4-BE49-F238E27FC236}">
-                <a16:creationId xmlns:a16="http://schemas.microsoft.com/office/drawing/2014/main" id="{D59C872A-C57F-4B1F-AFD0-FDF125C3C485}"/>
-              </a:ext>
-            </a:extLst>
-          </p:cNvPr>
-          <p:cNvCxnSpPr/>
-          <p:nvPr userDrawn="1"/>
-        </p:nvCxnSpPr>
-        <p:spPr>
-          <a:xfrm>
-            <a:off x="175260" y="6316935"/>
-            <a:ext cx="8831580" cy="0"/>
-          </a:xfrm>
-          <a:prstGeom prst="line">
-            <a:avLst/>
-          </a:prstGeom>
-        </p:spPr>
-        <p:style>
-          <a:lnRef idx="1">
-            <a:schemeClr val="dk1"/>
-          </a:lnRef>
-          <a:fillRef idx="0">
-            <a:schemeClr val="dk1"/>
-          </a:fillRef>
-          <a:effectRef idx="0">
-            <a:schemeClr val="dk1"/>
-          </a:effectRef>
-          <a:fontRef idx="minor">
-            <a:schemeClr val="tx1"/>
-          </a:fontRef>
-        </p:style>
-      </p:cxnSp>
-    </p:spTree>
-    <p:extLst>
-      <p:ext uri="{BB962C8B-B14F-4D97-AF65-F5344CB8AC3E}">
-        <p14:creationId xmlns:p14="http://schemas.microsoft.com/office/powerpoint/2010/main" val="1690037162"/>
-      </p:ext>
-    </p:extLst>
-  </p:cSld>
-  <p:clrMapOvr>
-    <a:masterClrMapping/>
-  </p:clrMapOvr>
-</p:sldLayout>
-</file>
-
-<file path=ppt/slideLayouts/slideLayout3.xml><?xml version="1.0" encoding="utf-8"?>
-<p:sldLayout xmlns:a="http://schemas.openxmlformats.org/drawingml/2006/main" xmlns:r="http://schemas.openxmlformats.org/officeDocument/2006/relationships" xmlns:p="http://schemas.openxmlformats.org/presentationml/2006/main" type="secHead" preserve="1">
-  <p:cSld name="Section Header">
-    <p:spTree>
-      <p:nvGrpSpPr>
-        <p:cNvPr id="1" name=""/>
-        <p:cNvGrpSpPr/>
-        <p:nvPr/>
-      </p:nvGrpSpPr>
-      <p:grpSpPr>
-        <a:xfrm>
-          <a:off x="0" y="0"/>
-          <a:ext cx="0" cy="0"/>
-          <a:chOff x="0" y="0"/>
-          <a:chExt cx="0" cy="0"/>
-        </a:xfrm>
-      </p:grpSpPr>
-      <p:sp>
-        <p:nvSpPr>
-          <p:cNvPr id="8" name="Rectangle 7"/>
-          <p:cNvSpPr>
-            <a:spLocks noChangeAspect="1"/>
-          </p:cNvSpPr>
-          <p:nvPr/>
-        </p:nvSpPr>
-        <p:spPr>
-          <a:xfrm>
-            <a:off x="452646" y="5141973"/>
-            <a:ext cx="8238707" cy="1258827"/>
-          </a:xfrm>
-          <a:prstGeom prst="rect">
-            <a:avLst/>
-          </a:prstGeom>
-          <a:solidFill>
-            <a:schemeClr val="accent1"/>
-          </a:solidFill>
-          <a:ln>
-            <a:noFill/>
-          </a:ln>
-          <a:effectLst/>
-        </p:spPr>
-        <p:style>
-          <a:lnRef idx="1">
-            <a:schemeClr val="accent1"/>
-          </a:lnRef>
-          <a:fillRef idx="3">
-            <a:schemeClr val="accent1"/>
-          </a:fillRef>
-          <a:effectRef idx="2">
-            <a:schemeClr val="accent1"/>
-          </a:effectRef>
-          <a:fontRef idx="minor">
-            <a:schemeClr val="lt1"/>
-          </a:fontRef>
-        </p:style>
-      </p:sp>
-      <p:sp>
-        <p:nvSpPr>
-          <p:cNvPr id="2" name="Title 1"/>
-          <p:cNvSpPr>
-            <a:spLocks noGrp="1"/>
-          </p:cNvSpPr>
-          <p:nvPr>
-            <p:ph type="title"/>
-          </p:nvPr>
-        </p:nvSpPr>
-        <p:spPr>
-          <a:xfrm>
-            <a:off x="581193" y="3036573"/>
-            <a:ext cx="7989751" cy="1504844"/>
-          </a:xfrm>
-        </p:spPr>
-        <p:txBody>
-          <a:bodyPr anchor="b">
-            <a:normAutofit/>
-          </a:bodyPr>
-          <a:lstStyle>
-            <a:lvl1pPr algn="l">
-              <a:defRPr sz="3600" b="0" cap="all">
-                <a:solidFill>
-                  <a:schemeClr val="accent1"/>
-                </a:solidFill>
-              </a:defRPr>
-            </a:lvl1pPr>
-          </a:lstStyle>
-          <a:p>
-            <a:r>
-              <a:rPr lang="en-US"/>
-              <a:t>Click to edit Master title style</a:t>
-            </a:r>
-            <a:endParaRPr lang="en-US" dirty="0"/>
-          </a:p>
-        </p:txBody>
-      </p:sp>
-      <p:sp>
-        <p:nvSpPr>
-          <p:cNvPr id="3" name="Text Placeholder 2"/>
-          <p:cNvSpPr>
-            <a:spLocks noGrp="1"/>
-          </p:cNvSpPr>
-          <p:nvPr>
-            <p:ph type="body" idx="1"/>
-          </p:nvPr>
-        </p:nvSpPr>
-        <p:spPr>
-          <a:xfrm>
-            <a:off x="581193" y="4541417"/>
-            <a:ext cx="7989751" cy="600556"/>
-          </a:xfrm>
-        </p:spPr>
-        <p:txBody>
-          <a:bodyPr anchor="t">
-            <a:normAutofit/>
-          </a:bodyPr>
-          <a:lstStyle>
-            <a:lvl1pPr marL="0" indent="0" algn="l">
-              <a:buNone/>
-              <a:defRPr sz="1800" cap="all">
-                <a:solidFill>
-                  <a:schemeClr val="accent2"/>
-                </a:solidFill>
-              </a:defRPr>
-            </a:lvl1pPr>
-            <a:lvl2pPr marL="457200" indent="0">
-              <a:buNone/>
-              <a:defRPr sz="1800">
-                <a:solidFill>
-                  <a:schemeClr val="tx1">
-                    <a:tint val="75000"/>
-                  </a:schemeClr>
-                </a:solidFill>
-              </a:defRPr>
-            </a:lvl2pPr>
-            <a:lvl3pPr marL="914400" indent="0">
-              <a:buNone/>
-              <a:defRPr sz="1600">
-                <a:solidFill>
-                  <a:schemeClr val="tx1">
-                    <a:tint val="75000"/>
-                  </a:schemeClr>
-                </a:solidFill>
-              </a:defRPr>
-            </a:lvl3pPr>
-            <a:lvl4pPr marL="1371600" indent="0">
-              <a:buNone/>
-              <a:defRPr sz="1400">
-                <a:solidFill>
-                  <a:schemeClr val="tx1">
-                    <a:tint val="75000"/>
-                  </a:schemeClr>
-                </a:solidFill>
-              </a:defRPr>
-            </a:lvl4pPr>
-            <a:lvl5pPr marL="1828800" indent="0">
-              <a:buNone/>
-              <a:defRPr sz="1400">
-                <a:solidFill>
-                  <a:schemeClr val="tx1">
-                    <a:tint val="75000"/>
-                  </a:schemeClr>
-                </a:solidFill>
-              </a:defRPr>
-            </a:lvl5pPr>
-            <a:lvl6pPr marL="2286000" indent="0">
-              <a:buNone/>
-              <a:defRPr sz="1400">
-                <a:solidFill>
-                  <a:schemeClr val="tx1">
-                    <a:tint val="75000"/>
-                  </a:schemeClr>
-                </a:solidFill>
-              </a:defRPr>
-            </a:lvl6pPr>
-            <a:lvl7pPr marL="2743200" indent="0">
-              <a:buNone/>
-              <a:defRPr sz="1400">
-                <a:solidFill>
-                  <a:schemeClr val="tx1">
-                    <a:tint val="75000"/>
-                  </a:schemeClr>
-                </a:solidFill>
-              </a:defRPr>
-            </a:lvl7pPr>
-            <a:lvl8pPr marL="3200400" indent="0">
-              <a:buNone/>
-              <a:defRPr sz="1400">
-                <a:solidFill>
-                  <a:schemeClr val="tx1">
-                    <a:tint val="75000"/>
-                  </a:schemeClr>
-                </a:solidFill>
-              </a:defRPr>
-            </a:lvl8pPr>
-            <a:lvl9pPr marL="3657600" indent="0">
-              <a:buNone/>
-              <a:defRPr sz="1400">
-                <a:solidFill>
-                  <a:schemeClr val="tx1">
-                    <a:tint val="75000"/>
-                  </a:schemeClr>
-                </a:solidFill>
-              </a:defRPr>
-            </a:lvl9pPr>
-          </a:lstStyle>
-          <a:p>
-            <a:pPr lvl="0"/>
-            <a:r>
-              <a:rPr lang="en-US"/>
-              <a:t>Click to edit Master text styles</a:t>
-            </a:r>
-          </a:p>
-        </p:txBody>
-      </p:sp>
-      <p:sp>
-        <p:nvSpPr>
-          <p:cNvPr id="4" name="Date Placeholder 3"/>
-          <p:cNvSpPr>
-            <a:spLocks noGrp="1"/>
-          </p:cNvSpPr>
-          <p:nvPr>
-            <p:ph type="dt" sz="half" idx="10"/>
-          </p:nvPr>
-        </p:nvSpPr>
-        <p:spPr>
-          <a:xfrm>
-            <a:off x="5559327" y="5956136"/>
-            <a:ext cx="2133600" cy="365125"/>
-          </a:xfrm>
-          <a:prstGeom prst="rect">
-            <a:avLst/>
-          </a:prstGeom>
-        </p:spPr>
-        <p:txBody>
-          <a:bodyPr/>
-          <a:lstStyle>
-            <a:lvl1pPr>
-              <a:defRPr>
-                <a:solidFill>
-                  <a:schemeClr val="accent1">
-                    <a:lumMod val="75000"/>
-                    <a:lumOff val="25000"/>
-                  </a:schemeClr>
-                </a:solidFill>
-              </a:defRPr>
-            </a:lvl1pPr>
-          </a:lstStyle>
-          <a:p>
-            <a:endParaRPr lang="en-US"/>
-          </a:p>
-        </p:txBody>
-      </p:sp>
-      <p:sp>
-        <p:nvSpPr>
-          <p:cNvPr id="5" name="Footer Placeholder 4"/>
-          <p:cNvSpPr>
-            <a:spLocks noGrp="1"/>
-          </p:cNvSpPr>
-          <p:nvPr>
-            <p:ph type="ftr" sz="quarter" idx="11"/>
-          </p:nvPr>
-        </p:nvSpPr>
-        <p:spPr>
-          <a:xfrm>
-            <a:off x="581192" y="5951810"/>
-            <a:ext cx="4870585" cy="365125"/>
-          </a:xfrm>
-          <a:prstGeom prst="rect">
-            <a:avLst/>
-          </a:prstGeom>
-        </p:spPr>
-        <p:txBody>
-          <a:bodyPr/>
-          <a:lstStyle>
-            <a:lvl1pPr>
-              <a:defRPr>
-                <a:solidFill>
-                  <a:schemeClr val="accent1">
-                    <a:lumMod val="75000"/>
-                    <a:lumOff val="25000"/>
-                  </a:schemeClr>
-                </a:solidFill>
-              </a:defRPr>
-            </a:lvl1pPr>
-          </a:lstStyle>
-          <a:p>
-            <a:r>
-              <a:rPr lang="en-US"/>
-              <a:t>Copyright © 2020 SPIKE Prime Lessons (primelessons.org) CC-BY-NC-SA.  (Last edit: 1/9/2020)</a:t>
-            </a:r>
-            <a:endParaRPr lang="en-US" dirty="0"/>
-          </a:p>
-        </p:txBody>
-      </p:sp>
-      <p:sp>
-        <p:nvSpPr>
-          <p:cNvPr id="6" name="Slide Number Placeholder 5"/>
-          <p:cNvSpPr>
-            <a:spLocks noGrp="1"/>
-          </p:cNvSpPr>
-          <p:nvPr>
-            <p:ph type="sldNum" sz="quarter" idx="12"/>
-          </p:nvPr>
-        </p:nvSpPr>
-        <p:spPr>
-          <a:xfrm>
-            <a:off x="7800476" y="5956136"/>
-            <a:ext cx="770468" cy="365125"/>
-          </a:xfrm>
-          <a:prstGeom prst="rect">
-            <a:avLst/>
-          </a:prstGeom>
-        </p:spPr>
-        <p:txBody>
-          <a:bodyPr/>
-          <a:lstStyle>
-            <a:lvl1pPr>
-              <a:defRPr>
-                <a:solidFill>
-                  <a:schemeClr val="accent1">
-                    <a:lumMod val="75000"/>
-                    <a:lumOff val="25000"/>
-                  </a:schemeClr>
-                </a:solidFill>
-              </a:defRPr>
-            </a:lvl1pPr>
-          </a:lstStyle>
-          <a:p>
-            <a:fld id="{BBD74847-7BE4-4E4D-8159-51DF7B93C616}" type="slidenum">
-              <a:rPr lang="en-US" smtClean="0"/>
-              <a:t>‹#›</a:t>
-            </a:fld>
-            <a:endParaRPr lang="en-US"/>
-          </a:p>
-        </p:txBody>
-      </p:sp>
-      <p:sp>
-        <p:nvSpPr>
-          <p:cNvPr id="11" name="Rectangle 10">
-            <a:extLst>
-              <a:ext uri="{FF2B5EF4-FFF2-40B4-BE49-F238E27FC236}">
-                <a16:creationId xmlns:a16="http://schemas.microsoft.com/office/drawing/2014/main" id="{A9F621E0-AEE7-4799-81EB-EB99ED60C8DF}"/>
-              </a:ext>
-            </a:extLst>
-          </p:cNvPr>
-          <p:cNvSpPr>
-            <a:spLocks noChangeAspect="1"/>
-          </p:cNvSpPr>
-          <p:nvPr userDrawn="1"/>
-        </p:nvSpPr>
-        <p:spPr>
-          <a:xfrm>
-            <a:off x="142200" y="249101"/>
-            <a:ext cx="8831579" cy="840455"/>
-          </a:xfrm>
-          <a:prstGeom prst="rect">
-            <a:avLst/>
-          </a:prstGeom>
-          <a:solidFill>
-            <a:schemeClr val="accent1"/>
-          </a:solidFill>
-          <a:ln>
-            <a:noFill/>
-          </a:ln>
-          <a:effectLst/>
-        </p:spPr>
-        <p:style>
-          <a:lnRef idx="1">
-            <a:schemeClr val="accent1"/>
-          </a:lnRef>
-          <a:fillRef idx="3">
-            <a:schemeClr val="accent1"/>
-          </a:fillRef>
-          <a:effectRef idx="2">
-            <a:schemeClr val="accent1"/>
-          </a:effectRef>
-          <a:fontRef idx="minor">
-            <a:schemeClr val="lt1"/>
-          </a:fontRef>
-        </p:style>
-        <p:txBody>
-          <a:bodyPr/>
-          <a:lstStyle/>
-          <a:p>
-            <a:endParaRPr lang="en-US" dirty="0"/>
-          </a:p>
-        </p:txBody>
-      </p:sp>
-      <p:sp>
-        <p:nvSpPr>
-          <p:cNvPr id="12" name="Title 1">
-            <a:extLst>
-              <a:ext uri="{FF2B5EF4-FFF2-40B4-BE49-F238E27FC236}">
-                <a16:creationId xmlns:a16="http://schemas.microsoft.com/office/drawing/2014/main" id="{B40FAB25-E17C-4189-8846-137BC28A1EB3}"/>
-              </a:ext>
-            </a:extLst>
-          </p:cNvPr>
-          <p:cNvSpPr txBox="1">
-            <a:spLocks/>
-          </p:cNvSpPr>
-          <p:nvPr userDrawn="1"/>
-        </p:nvSpPr>
-        <p:spPr>
-          <a:xfrm>
-            <a:off x="175260" y="292975"/>
-            <a:ext cx="8746864" cy="752706"/>
-          </a:xfrm>
-          <a:prstGeom prst="rect">
-            <a:avLst/>
-          </a:prstGeom>
-        </p:spPr>
-        <p:txBody>
-          <a:bodyPr vert="horz" lIns="91440" tIns="45720" rIns="91440" bIns="45720" rtlCol="0" anchor="t">
-            <a:normAutofit/>
-          </a:bodyPr>
-          <a:lstStyle>
-            <a:lvl1pPr algn="l" defTabSz="457200" rtl="0" eaLnBrk="1" latinLnBrk="0" hangingPunct="1">
-              <a:spcBef>
-                <a:spcPct val="0"/>
-              </a:spcBef>
-              <a:buNone/>
-              <a:defRPr sz="2800" b="0" kern="1200" cap="all">
-                <a:solidFill>
-                  <a:schemeClr val="tx1"/>
-                </a:solidFill>
-                <a:latin typeface="+mj-lt"/>
-                <a:ea typeface="+mj-ea"/>
-                <a:cs typeface="+mj-cs"/>
-              </a:defRPr>
-            </a:lvl1pPr>
-            <a:lvl2pPr eaLnBrk="1" hangingPunct="1">
-              <a:defRPr>
-                <a:solidFill>
-                  <a:schemeClr val="tx2"/>
-                </a:solidFill>
-              </a:defRPr>
-            </a:lvl2pPr>
-            <a:lvl3pPr eaLnBrk="1" hangingPunct="1">
-              <a:defRPr>
-                <a:solidFill>
-                  <a:schemeClr val="tx2"/>
-                </a:solidFill>
-              </a:defRPr>
-            </a:lvl3pPr>
-            <a:lvl4pPr eaLnBrk="1" hangingPunct="1">
-              <a:defRPr>
-                <a:solidFill>
-                  <a:schemeClr val="tx2"/>
-                </a:solidFill>
-              </a:defRPr>
-            </a:lvl4pPr>
-            <a:lvl5pPr eaLnBrk="1" hangingPunct="1">
-              <a:defRPr>
-                <a:solidFill>
-                  <a:schemeClr val="tx2"/>
-                </a:solidFill>
-              </a:defRPr>
-            </a:lvl5pPr>
-            <a:lvl6pPr eaLnBrk="1" hangingPunct="1">
-              <a:defRPr>
-                <a:solidFill>
-                  <a:schemeClr val="tx2"/>
-                </a:solidFill>
-              </a:defRPr>
-            </a:lvl6pPr>
-            <a:lvl7pPr eaLnBrk="1" hangingPunct="1">
-              <a:defRPr>
-                <a:solidFill>
-                  <a:schemeClr val="tx2"/>
-                </a:solidFill>
-              </a:defRPr>
-            </a:lvl7pPr>
-            <a:lvl8pPr eaLnBrk="1" hangingPunct="1">
-              <a:defRPr>
-                <a:solidFill>
-                  <a:schemeClr val="tx2"/>
-                </a:solidFill>
-              </a:defRPr>
-            </a:lvl8pPr>
-            <a:lvl9pPr eaLnBrk="1" hangingPunct="1">
-              <a:defRPr>
-                <a:solidFill>
-                  <a:schemeClr val="tx2"/>
-                </a:solidFill>
-              </a:defRPr>
-            </a:lvl9pPr>
-          </a:lstStyle>
-          <a:p>
-            <a:r>
-              <a:rPr lang="en-US"/>
-              <a:t>Click to edit Master title style</a:t>
-            </a:r>
-            <a:endParaRPr lang="en-US" dirty="0"/>
-          </a:p>
-        </p:txBody>
-      </p:sp>
-    </p:spTree>
-    <p:extLst>
-      <p:ext uri="{BB962C8B-B14F-4D97-AF65-F5344CB8AC3E}">
-        <p14:creationId xmlns:p14="http://schemas.microsoft.com/office/powerpoint/2010/main" val="709269958"/>
-      </p:ext>
-    </p:extLst>
-  </p:cSld>
-  <p:clrMapOvr>
-    <a:masterClrMapping/>
-  </p:clrMapOvr>
-</p:sldLayout>
-</file>
-
-<file path=ppt/slideLayouts/slideLayout4.xml><?xml version="1.0" encoding="utf-8"?>
+<file path=ppt/slideLayouts/slideLayout12.xml><?xml version="1.0" encoding="utf-8"?>
 <p:sldLayout xmlns:a="http://schemas.openxmlformats.org/drawingml/2006/main" xmlns:r="http://schemas.openxmlformats.org/officeDocument/2006/relationships" xmlns:p="http://schemas.openxmlformats.org/presentationml/2006/main" preserve="1" userDrawn="1">
-  <p:cSld name="Two Content">
+  <p:cSld name="1_Two Content">
     <p:spTree>
       <p:nvGrpSpPr>
         <p:cNvPr id="1" name=""/>
@@ -3051,9 +2361,9 @@
 </p:sldLayout>
 </file>
 
-<file path=ppt/slideLayouts/slideLayout5.xml><?xml version="1.0" encoding="utf-8"?>
+<file path=ppt/slideLayouts/slideLayout13.xml><?xml version="1.0" encoding="utf-8"?>
 <p:sldLayout xmlns:a="http://schemas.openxmlformats.org/drawingml/2006/main" xmlns:r="http://schemas.openxmlformats.org/officeDocument/2006/relationships" xmlns:p="http://schemas.openxmlformats.org/presentationml/2006/main" preserve="1" userDrawn="1">
-  <p:cSld name="Comparison">
+  <p:cSld name="1_Comparison">
     <p:spTree>
       <p:nvGrpSpPr>
         <p:cNvPr id="1" name=""/>
@@ -3523,8 +2833,2446 @@
 </p:sldLayout>
 </file>
 
+<file path=ppt/slideLayouts/slideLayout14.xml><?xml version="1.0" encoding="utf-8"?>
+<p:sldLayout xmlns:a="http://schemas.openxmlformats.org/drawingml/2006/main" xmlns:r="http://schemas.openxmlformats.org/officeDocument/2006/relationships" xmlns:p="http://schemas.openxmlformats.org/presentationml/2006/main" preserve="1" userDrawn="1">
+  <p:cSld name="1_Title Only">
+    <p:spTree>
+      <p:nvGrpSpPr>
+        <p:cNvPr id="1" name=""/>
+        <p:cNvGrpSpPr/>
+        <p:nvPr/>
+      </p:nvGrpSpPr>
+      <p:grpSpPr>
+        <a:xfrm>
+          <a:off x="0" y="0"/>
+          <a:ext cx="0" cy="0"/>
+          <a:chOff x="0" y="0"/>
+          <a:chExt cx="0" cy="0"/>
+        </a:xfrm>
+      </p:grpSpPr>
+      <p:sp>
+        <p:nvSpPr>
+          <p:cNvPr id="7" name="Footer Placeholder 4">
+            <a:extLst>
+              <a:ext uri="{FF2B5EF4-FFF2-40B4-BE49-F238E27FC236}">
+                <a16:creationId xmlns:a16="http://schemas.microsoft.com/office/drawing/2014/main" id="{42632993-FC7F-42E0-9D01-6C58965FB8BB}"/>
+              </a:ext>
+            </a:extLst>
+          </p:cNvPr>
+          <p:cNvSpPr>
+            <a:spLocks noGrp="1"/>
+          </p:cNvSpPr>
+          <p:nvPr>
+            <p:ph type="ftr" sz="quarter" idx="11"/>
+          </p:nvPr>
+        </p:nvSpPr>
+        <p:spPr>
+          <a:xfrm>
+            <a:off x="88409" y="6266485"/>
+            <a:ext cx="4870585" cy="365125"/>
+          </a:xfrm>
+          <a:prstGeom prst="rect">
+            <a:avLst/>
+          </a:prstGeom>
+        </p:spPr>
+        <p:txBody>
+          <a:bodyPr/>
+          <a:lstStyle/>
+          <a:p>
+            <a:r>
+              <a:rPr lang="en-US"/>
+              <a:t>Copyright © 2020 SPIKE Prime Lessons (primelessons.org) CC-BY-NC-SA.  (Last edit: 1/9/2020)</a:t>
+            </a:r>
+            <a:endParaRPr lang="en-US" dirty="0"/>
+          </a:p>
+        </p:txBody>
+      </p:sp>
+      <p:sp>
+        <p:nvSpPr>
+          <p:cNvPr id="8" name="Slide Number Placeholder 5">
+            <a:extLst>
+              <a:ext uri="{FF2B5EF4-FFF2-40B4-BE49-F238E27FC236}">
+                <a16:creationId xmlns:a16="http://schemas.microsoft.com/office/drawing/2014/main" id="{57B8D68D-165F-4007-99ED-9807B7E8CBDC}"/>
+              </a:ext>
+            </a:extLst>
+          </p:cNvPr>
+          <p:cNvSpPr>
+            <a:spLocks noGrp="1"/>
+          </p:cNvSpPr>
+          <p:nvPr>
+            <p:ph type="sldNum" sz="quarter" idx="12"/>
+          </p:nvPr>
+        </p:nvSpPr>
+        <p:spPr>
+          <a:xfrm>
+            <a:off x="8236372" y="6280641"/>
+            <a:ext cx="770468" cy="365125"/>
+          </a:xfrm>
+          <a:prstGeom prst="rect">
+            <a:avLst/>
+          </a:prstGeom>
+        </p:spPr>
+        <p:txBody>
+          <a:bodyPr/>
+          <a:lstStyle/>
+          <a:p>
+            <a:fld id="{BBD74847-7BE4-4E4D-8159-51DF7B93C616}" type="slidenum">
+              <a:rPr lang="en-US" smtClean="0"/>
+              <a:t>‹#›</a:t>
+            </a:fld>
+            <a:endParaRPr lang="en-US"/>
+          </a:p>
+        </p:txBody>
+      </p:sp>
+      <p:cxnSp>
+        <p:nvCxnSpPr>
+          <p:cNvPr id="9" name="Straight Connector 8">
+            <a:extLst>
+              <a:ext uri="{FF2B5EF4-FFF2-40B4-BE49-F238E27FC236}">
+                <a16:creationId xmlns:a16="http://schemas.microsoft.com/office/drawing/2014/main" id="{72068E05-BA91-41C0-82CA-8F2AD35C67E8}"/>
+              </a:ext>
+            </a:extLst>
+          </p:cNvPr>
+          <p:cNvCxnSpPr/>
+          <p:nvPr userDrawn="1"/>
+        </p:nvCxnSpPr>
+        <p:spPr>
+          <a:xfrm>
+            <a:off x="175260" y="6316935"/>
+            <a:ext cx="8831580" cy="0"/>
+          </a:xfrm>
+          <a:prstGeom prst="line">
+            <a:avLst/>
+          </a:prstGeom>
+        </p:spPr>
+        <p:style>
+          <a:lnRef idx="1">
+            <a:schemeClr val="dk1"/>
+          </a:lnRef>
+          <a:fillRef idx="0">
+            <a:schemeClr val="dk1"/>
+          </a:fillRef>
+          <a:effectRef idx="0">
+            <a:schemeClr val="dk1"/>
+          </a:effectRef>
+          <a:fontRef idx="minor">
+            <a:schemeClr val="tx1"/>
+          </a:fontRef>
+        </p:style>
+      </p:cxnSp>
+      <p:sp>
+        <p:nvSpPr>
+          <p:cNvPr id="13" name="Rectangle 12">
+            <a:extLst>
+              <a:ext uri="{FF2B5EF4-FFF2-40B4-BE49-F238E27FC236}">
+                <a16:creationId xmlns:a16="http://schemas.microsoft.com/office/drawing/2014/main" id="{B2971BF8-D77B-4814-931D-48F5EB38C3C1}"/>
+              </a:ext>
+            </a:extLst>
+          </p:cNvPr>
+          <p:cNvSpPr>
+            <a:spLocks noChangeAspect="1"/>
+          </p:cNvSpPr>
+          <p:nvPr userDrawn="1"/>
+        </p:nvSpPr>
+        <p:spPr>
+          <a:xfrm>
+            <a:off x="142200" y="249101"/>
+            <a:ext cx="8831579" cy="840455"/>
+          </a:xfrm>
+          <a:prstGeom prst="rect">
+            <a:avLst/>
+          </a:prstGeom>
+          <a:solidFill>
+            <a:schemeClr val="accent1"/>
+          </a:solidFill>
+          <a:ln>
+            <a:noFill/>
+          </a:ln>
+          <a:effectLst/>
+        </p:spPr>
+        <p:style>
+          <a:lnRef idx="1">
+            <a:schemeClr val="accent1"/>
+          </a:lnRef>
+          <a:fillRef idx="3">
+            <a:schemeClr val="accent1"/>
+          </a:fillRef>
+          <a:effectRef idx="2">
+            <a:schemeClr val="accent1"/>
+          </a:effectRef>
+          <a:fontRef idx="minor">
+            <a:schemeClr val="lt1"/>
+          </a:fontRef>
+        </p:style>
+        <p:txBody>
+          <a:bodyPr/>
+          <a:lstStyle/>
+          <a:p>
+            <a:endParaRPr lang="en-US" dirty="0"/>
+          </a:p>
+        </p:txBody>
+      </p:sp>
+      <p:sp>
+        <p:nvSpPr>
+          <p:cNvPr id="14" name="Title 1">
+            <a:extLst>
+              <a:ext uri="{FF2B5EF4-FFF2-40B4-BE49-F238E27FC236}">
+                <a16:creationId xmlns:a16="http://schemas.microsoft.com/office/drawing/2014/main" id="{37D59584-71E8-443A-AF13-6C99AD60823A}"/>
+              </a:ext>
+            </a:extLst>
+          </p:cNvPr>
+          <p:cNvSpPr>
+            <a:spLocks noGrp="1"/>
+          </p:cNvSpPr>
+          <p:nvPr>
+            <p:ph type="title"/>
+          </p:nvPr>
+        </p:nvSpPr>
+        <p:spPr>
+          <a:xfrm>
+            <a:off x="175260" y="292975"/>
+            <a:ext cx="8746864" cy="752706"/>
+          </a:xfrm>
+        </p:spPr>
+        <p:txBody>
+          <a:bodyPr anchor="t"/>
+          <a:lstStyle>
+            <a:lvl1pPr>
+              <a:defRPr>
+                <a:solidFill>
+                  <a:schemeClr val="tx1"/>
+                </a:solidFill>
+              </a:defRPr>
+            </a:lvl1pPr>
+          </a:lstStyle>
+          <a:p>
+            <a:r>
+              <a:rPr lang="en-US" dirty="0"/>
+              <a:t>Click to edit Master title style</a:t>
+            </a:r>
+          </a:p>
+        </p:txBody>
+      </p:sp>
+    </p:spTree>
+    <p:extLst>
+      <p:ext uri="{BB962C8B-B14F-4D97-AF65-F5344CB8AC3E}">
+        <p14:creationId xmlns:p14="http://schemas.microsoft.com/office/powerpoint/2010/main" val="997795342"/>
+      </p:ext>
+    </p:extLst>
+  </p:cSld>
+  <p:clrMapOvr>
+    <a:masterClrMapping/>
+  </p:clrMapOvr>
+</p:sldLayout>
+</file>
+
+<file path=ppt/slideLayouts/slideLayout15.xml><?xml version="1.0" encoding="utf-8"?>
+<p:sldLayout xmlns:a="http://schemas.openxmlformats.org/drawingml/2006/main" xmlns:r="http://schemas.openxmlformats.org/officeDocument/2006/relationships" xmlns:p="http://schemas.openxmlformats.org/presentationml/2006/main" preserve="1" userDrawn="1">
+  <p:cSld name="1_Blank">
+    <p:spTree>
+      <p:nvGrpSpPr>
+        <p:cNvPr id="1" name=""/>
+        <p:cNvGrpSpPr/>
+        <p:nvPr/>
+      </p:nvGrpSpPr>
+      <p:grpSpPr>
+        <a:xfrm>
+          <a:off x="0" y="0"/>
+          <a:ext cx="0" cy="0"/>
+          <a:chOff x="0" y="0"/>
+          <a:chExt cx="0" cy="0"/>
+        </a:xfrm>
+      </p:grpSpPr>
+      <p:sp>
+        <p:nvSpPr>
+          <p:cNvPr id="8" name="Rectangle 7">
+            <a:extLst>
+              <a:ext uri="{FF2B5EF4-FFF2-40B4-BE49-F238E27FC236}">
+                <a16:creationId xmlns:a16="http://schemas.microsoft.com/office/drawing/2014/main" id="{8DE18750-3B08-429F-A276-D977DF7F7295}"/>
+              </a:ext>
+            </a:extLst>
+          </p:cNvPr>
+          <p:cNvSpPr>
+            <a:spLocks noChangeAspect="1"/>
+          </p:cNvSpPr>
+          <p:nvPr userDrawn="1"/>
+        </p:nvSpPr>
+        <p:spPr>
+          <a:xfrm>
+            <a:off x="142200" y="249101"/>
+            <a:ext cx="8831579" cy="840455"/>
+          </a:xfrm>
+          <a:prstGeom prst="rect">
+            <a:avLst/>
+          </a:prstGeom>
+          <a:solidFill>
+            <a:schemeClr val="accent1"/>
+          </a:solidFill>
+          <a:ln>
+            <a:noFill/>
+          </a:ln>
+          <a:effectLst/>
+        </p:spPr>
+        <p:style>
+          <a:lnRef idx="1">
+            <a:schemeClr val="accent1"/>
+          </a:lnRef>
+          <a:fillRef idx="3">
+            <a:schemeClr val="accent1"/>
+          </a:fillRef>
+          <a:effectRef idx="2">
+            <a:schemeClr val="accent1"/>
+          </a:effectRef>
+          <a:fontRef idx="minor">
+            <a:schemeClr val="lt1"/>
+          </a:fontRef>
+        </p:style>
+        <p:txBody>
+          <a:bodyPr/>
+          <a:lstStyle/>
+          <a:p>
+            <a:endParaRPr lang="en-US" dirty="0"/>
+          </a:p>
+        </p:txBody>
+      </p:sp>
+      <p:sp>
+        <p:nvSpPr>
+          <p:cNvPr id="9" name="Title 1">
+            <a:extLst>
+              <a:ext uri="{FF2B5EF4-FFF2-40B4-BE49-F238E27FC236}">
+                <a16:creationId xmlns:a16="http://schemas.microsoft.com/office/drawing/2014/main" id="{09B12976-4243-42C3-AD82-8647817437DB}"/>
+              </a:ext>
+            </a:extLst>
+          </p:cNvPr>
+          <p:cNvSpPr>
+            <a:spLocks noGrp="1"/>
+          </p:cNvSpPr>
+          <p:nvPr>
+            <p:ph type="title"/>
+          </p:nvPr>
+        </p:nvSpPr>
+        <p:spPr>
+          <a:xfrm>
+            <a:off x="175260" y="292975"/>
+            <a:ext cx="8746864" cy="752706"/>
+          </a:xfrm>
+        </p:spPr>
+        <p:txBody>
+          <a:bodyPr anchor="t"/>
+          <a:lstStyle>
+            <a:lvl1pPr>
+              <a:defRPr>
+                <a:solidFill>
+                  <a:schemeClr val="tx1"/>
+                </a:solidFill>
+              </a:defRPr>
+            </a:lvl1pPr>
+          </a:lstStyle>
+          <a:p>
+            <a:r>
+              <a:rPr lang="en-US" dirty="0"/>
+              <a:t>Click to edit Master title style</a:t>
+            </a:r>
+          </a:p>
+        </p:txBody>
+      </p:sp>
+      <p:sp>
+        <p:nvSpPr>
+          <p:cNvPr id="10" name="Slide Number Placeholder 5">
+            <a:extLst>
+              <a:ext uri="{FF2B5EF4-FFF2-40B4-BE49-F238E27FC236}">
+                <a16:creationId xmlns:a16="http://schemas.microsoft.com/office/drawing/2014/main" id="{AB5BF95A-3885-4491-876B-4C99D444A819}"/>
+              </a:ext>
+            </a:extLst>
+          </p:cNvPr>
+          <p:cNvSpPr>
+            <a:spLocks noGrp="1"/>
+          </p:cNvSpPr>
+          <p:nvPr>
+            <p:ph type="sldNum" sz="quarter" idx="12"/>
+          </p:nvPr>
+        </p:nvSpPr>
+        <p:spPr>
+          <a:xfrm>
+            <a:off x="8236372" y="6280641"/>
+            <a:ext cx="770468" cy="365125"/>
+          </a:xfrm>
+          <a:prstGeom prst="rect">
+            <a:avLst/>
+          </a:prstGeom>
+        </p:spPr>
+        <p:txBody>
+          <a:bodyPr/>
+          <a:lstStyle/>
+          <a:p>
+            <a:fld id="{BBD74847-7BE4-4E4D-8159-51DF7B93C616}" type="slidenum">
+              <a:rPr lang="en-US" smtClean="0"/>
+              <a:t>‹#›</a:t>
+            </a:fld>
+            <a:endParaRPr lang="en-US"/>
+          </a:p>
+        </p:txBody>
+      </p:sp>
+      <p:cxnSp>
+        <p:nvCxnSpPr>
+          <p:cNvPr id="11" name="Straight Connector 10">
+            <a:extLst>
+              <a:ext uri="{FF2B5EF4-FFF2-40B4-BE49-F238E27FC236}">
+                <a16:creationId xmlns:a16="http://schemas.microsoft.com/office/drawing/2014/main" id="{A625C0E0-87AD-4A9A-8CC2-D51E549C54AC}"/>
+              </a:ext>
+            </a:extLst>
+          </p:cNvPr>
+          <p:cNvCxnSpPr/>
+          <p:nvPr userDrawn="1"/>
+        </p:nvCxnSpPr>
+        <p:spPr>
+          <a:xfrm>
+            <a:off x="175260" y="6316935"/>
+            <a:ext cx="8831580" cy="0"/>
+          </a:xfrm>
+          <a:prstGeom prst="line">
+            <a:avLst/>
+          </a:prstGeom>
+        </p:spPr>
+        <p:style>
+          <a:lnRef idx="1">
+            <a:schemeClr val="dk1"/>
+          </a:lnRef>
+          <a:fillRef idx="0">
+            <a:schemeClr val="dk1"/>
+          </a:fillRef>
+          <a:effectRef idx="0">
+            <a:schemeClr val="dk1"/>
+          </a:effectRef>
+          <a:fontRef idx="minor">
+            <a:schemeClr val="tx1"/>
+          </a:fontRef>
+        </p:style>
+      </p:cxnSp>
+      <p:sp>
+        <p:nvSpPr>
+          <p:cNvPr id="12" name="Footer Placeholder 4">
+            <a:extLst>
+              <a:ext uri="{FF2B5EF4-FFF2-40B4-BE49-F238E27FC236}">
+                <a16:creationId xmlns:a16="http://schemas.microsoft.com/office/drawing/2014/main" id="{957F6DEB-B3FE-4632-A871-23BAA7FEADD1}"/>
+              </a:ext>
+            </a:extLst>
+          </p:cNvPr>
+          <p:cNvSpPr>
+            <a:spLocks noGrp="1"/>
+          </p:cNvSpPr>
+          <p:nvPr>
+            <p:ph type="ftr" sz="quarter" idx="11"/>
+          </p:nvPr>
+        </p:nvSpPr>
+        <p:spPr>
+          <a:xfrm>
+            <a:off x="88409" y="6266485"/>
+            <a:ext cx="4870585" cy="365125"/>
+          </a:xfrm>
+          <a:prstGeom prst="rect">
+            <a:avLst/>
+          </a:prstGeom>
+        </p:spPr>
+        <p:txBody>
+          <a:bodyPr/>
+          <a:lstStyle/>
+          <a:p>
+            <a:r>
+              <a:rPr lang="en-US"/>
+              <a:t>Copyright © 2020 SPIKE Prime Lessons (primelessons.org) CC-BY-NC-SA.  (Last edit: 1/9/2020)</a:t>
+            </a:r>
+            <a:endParaRPr lang="en-US" dirty="0"/>
+          </a:p>
+        </p:txBody>
+      </p:sp>
+    </p:spTree>
+    <p:extLst>
+      <p:ext uri="{BB962C8B-B14F-4D97-AF65-F5344CB8AC3E}">
+        <p14:creationId xmlns:p14="http://schemas.microsoft.com/office/powerpoint/2010/main" val="2961518194"/>
+      </p:ext>
+    </p:extLst>
+  </p:cSld>
+  <p:clrMapOvr>
+    <a:masterClrMapping/>
+  </p:clrMapOvr>
+</p:sldLayout>
+</file>
+
+<file path=ppt/slideLayouts/slideLayout2.xml><?xml version="1.0" encoding="utf-8"?>
+<p:sldLayout xmlns:a="http://schemas.openxmlformats.org/drawingml/2006/main" xmlns:r="http://schemas.openxmlformats.org/officeDocument/2006/relationships" xmlns:p="http://schemas.openxmlformats.org/presentationml/2006/main" type="obj" preserve="1">
+  <p:cSld name="Title and Content">
+    <p:spTree>
+      <p:nvGrpSpPr>
+        <p:cNvPr id="1" name=""/>
+        <p:cNvGrpSpPr/>
+        <p:nvPr/>
+      </p:nvGrpSpPr>
+      <p:grpSpPr>
+        <a:xfrm>
+          <a:off x="0" y="0"/>
+          <a:ext cx="0" cy="0"/>
+          <a:chOff x="0" y="0"/>
+          <a:chExt cx="0" cy="0"/>
+        </a:xfrm>
+      </p:grpSpPr>
+      <p:sp>
+        <p:nvSpPr>
+          <p:cNvPr id="7" name="Rectangle 6"/>
+          <p:cNvSpPr>
+            <a:spLocks noChangeAspect="1"/>
+          </p:cNvSpPr>
+          <p:nvPr/>
+        </p:nvSpPr>
+        <p:spPr>
+          <a:xfrm>
+            <a:off x="142200" y="249101"/>
+            <a:ext cx="8831579" cy="840455"/>
+          </a:xfrm>
+          <a:prstGeom prst="rect">
+            <a:avLst/>
+          </a:prstGeom>
+          <a:solidFill>
+            <a:schemeClr val="accent1"/>
+          </a:solidFill>
+          <a:ln>
+            <a:noFill/>
+          </a:ln>
+          <a:effectLst/>
+        </p:spPr>
+        <p:style>
+          <a:lnRef idx="1">
+            <a:schemeClr val="accent1"/>
+          </a:lnRef>
+          <a:fillRef idx="3">
+            <a:schemeClr val="accent1"/>
+          </a:fillRef>
+          <a:effectRef idx="2">
+            <a:schemeClr val="accent1"/>
+          </a:effectRef>
+          <a:fontRef idx="minor">
+            <a:schemeClr val="lt1"/>
+          </a:fontRef>
+        </p:style>
+        <p:txBody>
+          <a:bodyPr/>
+          <a:lstStyle/>
+          <a:p>
+            <a:endParaRPr lang="en-US" dirty="0"/>
+          </a:p>
+        </p:txBody>
+      </p:sp>
+      <p:sp>
+        <p:nvSpPr>
+          <p:cNvPr id="2" name="Title 1"/>
+          <p:cNvSpPr>
+            <a:spLocks noGrp="1"/>
+          </p:cNvSpPr>
+          <p:nvPr>
+            <p:ph type="title"/>
+          </p:nvPr>
+        </p:nvSpPr>
+        <p:spPr>
+          <a:xfrm>
+            <a:off x="175260" y="292975"/>
+            <a:ext cx="8746864" cy="752706"/>
+          </a:xfrm>
+        </p:spPr>
+        <p:txBody>
+          <a:bodyPr anchor="t"/>
+          <a:lstStyle>
+            <a:lvl1pPr>
+              <a:defRPr>
+                <a:solidFill>
+                  <a:schemeClr val="tx1"/>
+                </a:solidFill>
+              </a:defRPr>
+            </a:lvl1pPr>
+          </a:lstStyle>
+          <a:p>
+            <a:r>
+              <a:rPr lang="en-US"/>
+              <a:t>Click to edit Master title style</a:t>
+            </a:r>
+            <a:endParaRPr lang="en-US" dirty="0"/>
+          </a:p>
+        </p:txBody>
+      </p:sp>
+      <p:sp>
+        <p:nvSpPr>
+          <p:cNvPr id="3" name="Content Placeholder 2"/>
+          <p:cNvSpPr>
+            <a:spLocks noGrp="1"/>
+          </p:cNvSpPr>
+          <p:nvPr>
+            <p:ph idx="1"/>
+          </p:nvPr>
+        </p:nvSpPr>
+        <p:spPr>
+          <a:xfrm>
+            <a:off x="155088" y="1140006"/>
+            <a:ext cx="8831580" cy="5082601"/>
+          </a:xfrm>
+        </p:spPr>
+        <p:txBody>
+          <a:bodyPr/>
+          <a:lstStyle/>
+          <a:p>
+            <a:pPr lvl="0"/>
+            <a:r>
+              <a:rPr lang="en-US"/>
+              <a:t>Click to edit Master text styles</a:t>
+            </a:r>
+          </a:p>
+          <a:p>
+            <a:pPr lvl="1"/>
+            <a:r>
+              <a:rPr lang="en-US"/>
+              <a:t>Second level</a:t>
+            </a:r>
+          </a:p>
+          <a:p>
+            <a:pPr lvl="2"/>
+            <a:r>
+              <a:rPr lang="en-US"/>
+              <a:t>Third level</a:t>
+            </a:r>
+          </a:p>
+          <a:p>
+            <a:pPr lvl="3"/>
+            <a:r>
+              <a:rPr lang="en-US"/>
+              <a:t>Fourth level</a:t>
+            </a:r>
+          </a:p>
+          <a:p>
+            <a:pPr lvl="4"/>
+            <a:r>
+              <a:rPr lang="en-US"/>
+              <a:t>Fifth level</a:t>
+            </a:r>
+            <a:endParaRPr lang="en-US" dirty="0"/>
+          </a:p>
+        </p:txBody>
+      </p:sp>
+      <p:sp>
+        <p:nvSpPr>
+          <p:cNvPr id="5" name="Footer Placeholder 4"/>
+          <p:cNvSpPr>
+            <a:spLocks noGrp="1"/>
+          </p:cNvSpPr>
+          <p:nvPr>
+            <p:ph type="ftr" sz="quarter" idx="11"/>
+          </p:nvPr>
+        </p:nvSpPr>
+        <p:spPr>
+          <a:xfrm>
+            <a:off x="88409" y="6320275"/>
+            <a:ext cx="4870585" cy="365125"/>
+          </a:xfrm>
+          <a:prstGeom prst="rect">
+            <a:avLst/>
+          </a:prstGeom>
+        </p:spPr>
+        <p:txBody>
+          <a:bodyPr/>
+          <a:lstStyle>
+            <a:lvl1pPr>
+              <a:defRPr sz="900"/>
+            </a:lvl1pPr>
+          </a:lstStyle>
+          <a:p>
+            <a:r>
+              <a:rPr lang="en-US"/>
+              <a:t>Copyright © 2020 SPIKE Prime Lessons (primelessons.org) CC-BY-NC-SA.  (Last edit: 1/9/2020)</a:t>
+            </a:r>
+            <a:endParaRPr lang="en-US" dirty="0"/>
+          </a:p>
+        </p:txBody>
+      </p:sp>
+      <p:sp>
+        <p:nvSpPr>
+          <p:cNvPr id="6" name="Slide Number Placeholder 5"/>
+          <p:cNvSpPr>
+            <a:spLocks noGrp="1"/>
+          </p:cNvSpPr>
+          <p:nvPr>
+            <p:ph type="sldNum" sz="quarter" idx="12"/>
+          </p:nvPr>
+        </p:nvSpPr>
+        <p:spPr>
+          <a:xfrm>
+            <a:off x="8236372" y="6316501"/>
+            <a:ext cx="770468" cy="365125"/>
+          </a:xfrm>
+          <a:prstGeom prst="rect">
+            <a:avLst/>
+          </a:prstGeom>
+        </p:spPr>
+        <p:txBody>
+          <a:bodyPr/>
+          <a:lstStyle/>
+          <a:p>
+            <a:fld id="{BBD74847-7BE4-4E4D-8159-51DF7B93C616}" type="slidenum">
+              <a:rPr lang="en-US" smtClean="0"/>
+              <a:t>‹#›</a:t>
+            </a:fld>
+            <a:endParaRPr lang="en-US"/>
+          </a:p>
+        </p:txBody>
+      </p:sp>
+      <p:cxnSp>
+        <p:nvCxnSpPr>
+          <p:cNvPr id="9" name="Straight Connector 8">
+            <a:extLst>
+              <a:ext uri="{FF2B5EF4-FFF2-40B4-BE49-F238E27FC236}">
+                <a16:creationId xmlns:a16="http://schemas.microsoft.com/office/drawing/2014/main" id="{D59C872A-C57F-4B1F-AFD0-FDF125C3C485}"/>
+              </a:ext>
+            </a:extLst>
+          </p:cNvPr>
+          <p:cNvCxnSpPr/>
+          <p:nvPr/>
+        </p:nvCxnSpPr>
+        <p:spPr>
+          <a:xfrm>
+            <a:off x="175260" y="6316935"/>
+            <a:ext cx="8831580" cy="0"/>
+          </a:xfrm>
+          <a:prstGeom prst="line">
+            <a:avLst/>
+          </a:prstGeom>
+        </p:spPr>
+        <p:style>
+          <a:lnRef idx="1">
+            <a:schemeClr val="dk1"/>
+          </a:lnRef>
+          <a:fillRef idx="0">
+            <a:schemeClr val="dk1"/>
+          </a:fillRef>
+          <a:effectRef idx="0">
+            <a:schemeClr val="dk1"/>
+          </a:effectRef>
+          <a:fontRef idx="minor">
+            <a:schemeClr val="tx1"/>
+          </a:fontRef>
+        </p:style>
+      </p:cxnSp>
+      <p:cxnSp>
+        <p:nvCxnSpPr>
+          <p:cNvPr id="8" name="Straight Connector 7">
+            <a:extLst>
+              <a:ext uri="{FF2B5EF4-FFF2-40B4-BE49-F238E27FC236}">
+                <a16:creationId xmlns:a16="http://schemas.microsoft.com/office/drawing/2014/main" id="{9554219E-3F72-2747-8AFE-C47A1E936F47}"/>
+              </a:ext>
+            </a:extLst>
+          </p:cNvPr>
+          <p:cNvCxnSpPr/>
+          <p:nvPr userDrawn="1"/>
+        </p:nvCxnSpPr>
+        <p:spPr>
+          <a:xfrm>
+            <a:off x="175260" y="6316935"/>
+            <a:ext cx="8831580" cy="0"/>
+          </a:xfrm>
+          <a:prstGeom prst="line">
+            <a:avLst/>
+          </a:prstGeom>
+        </p:spPr>
+        <p:style>
+          <a:lnRef idx="1">
+            <a:schemeClr val="dk1"/>
+          </a:lnRef>
+          <a:fillRef idx="0">
+            <a:schemeClr val="dk1"/>
+          </a:fillRef>
+          <a:effectRef idx="0">
+            <a:schemeClr val="dk1"/>
+          </a:effectRef>
+          <a:fontRef idx="minor">
+            <a:schemeClr val="tx1"/>
+          </a:fontRef>
+        </p:style>
+      </p:cxnSp>
+    </p:spTree>
+    <p:extLst>
+      <p:ext uri="{BB962C8B-B14F-4D97-AF65-F5344CB8AC3E}">
+        <p14:creationId xmlns:p14="http://schemas.microsoft.com/office/powerpoint/2010/main" val="3144696605"/>
+      </p:ext>
+    </p:extLst>
+  </p:cSld>
+  <p:clrMapOvr>
+    <a:masterClrMapping/>
+  </p:clrMapOvr>
+</p:sldLayout>
+</file>
+
+<file path=ppt/slideLayouts/slideLayout3.xml><?xml version="1.0" encoding="utf-8"?>
+<p:sldLayout xmlns:a="http://schemas.openxmlformats.org/drawingml/2006/main" xmlns:r="http://schemas.openxmlformats.org/officeDocument/2006/relationships" xmlns:p="http://schemas.openxmlformats.org/presentationml/2006/main" type="secHead" preserve="1">
+  <p:cSld name="Section Header">
+    <p:spTree>
+      <p:nvGrpSpPr>
+        <p:cNvPr id="1" name=""/>
+        <p:cNvGrpSpPr/>
+        <p:nvPr/>
+      </p:nvGrpSpPr>
+      <p:grpSpPr>
+        <a:xfrm>
+          <a:off x="0" y="0"/>
+          <a:ext cx="0" cy="0"/>
+          <a:chOff x="0" y="0"/>
+          <a:chExt cx="0" cy="0"/>
+        </a:xfrm>
+      </p:grpSpPr>
+      <p:sp>
+        <p:nvSpPr>
+          <p:cNvPr id="8" name="Rectangle 7"/>
+          <p:cNvSpPr>
+            <a:spLocks noChangeAspect="1"/>
+          </p:cNvSpPr>
+          <p:nvPr/>
+        </p:nvSpPr>
+        <p:spPr>
+          <a:xfrm>
+            <a:off x="452646" y="5141973"/>
+            <a:ext cx="8238707" cy="1258827"/>
+          </a:xfrm>
+          <a:prstGeom prst="rect">
+            <a:avLst/>
+          </a:prstGeom>
+          <a:solidFill>
+            <a:schemeClr val="accent1"/>
+          </a:solidFill>
+          <a:ln>
+            <a:noFill/>
+          </a:ln>
+          <a:effectLst/>
+        </p:spPr>
+        <p:style>
+          <a:lnRef idx="1">
+            <a:schemeClr val="accent1"/>
+          </a:lnRef>
+          <a:fillRef idx="3">
+            <a:schemeClr val="accent1"/>
+          </a:fillRef>
+          <a:effectRef idx="2">
+            <a:schemeClr val="accent1"/>
+          </a:effectRef>
+          <a:fontRef idx="minor">
+            <a:schemeClr val="lt1"/>
+          </a:fontRef>
+        </p:style>
+      </p:sp>
+      <p:sp>
+        <p:nvSpPr>
+          <p:cNvPr id="2" name="Title 1"/>
+          <p:cNvSpPr>
+            <a:spLocks noGrp="1"/>
+          </p:cNvSpPr>
+          <p:nvPr>
+            <p:ph type="title"/>
+          </p:nvPr>
+        </p:nvSpPr>
+        <p:spPr>
+          <a:xfrm>
+            <a:off x="581193" y="3036573"/>
+            <a:ext cx="7989751" cy="1504844"/>
+          </a:xfrm>
+        </p:spPr>
+        <p:txBody>
+          <a:bodyPr anchor="b">
+            <a:normAutofit/>
+          </a:bodyPr>
+          <a:lstStyle>
+            <a:lvl1pPr algn="l">
+              <a:defRPr sz="3600" b="0" cap="all">
+                <a:solidFill>
+                  <a:schemeClr val="accent1"/>
+                </a:solidFill>
+              </a:defRPr>
+            </a:lvl1pPr>
+          </a:lstStyle>
+          <a:p>
+            <a:r>
+              <a:rPr lang="en-US"/>
+              <a:t>Click to edit Master title style</a:t>
+            </a:r>
+            <a:endParaRPr lang="en-US" dirty="0"/>
+          </a:p>
+        </p:txBody>
+      </p:sp>
+      <p:sp>
+        <p:nvSpPr>
+          <p:cNvPr id="3" name="Text Placeholder 2"/>
+          <p:cNvSpPr>
+            <a:spLocks noGrp="1"/>
+          </p:cNvSpPr>
+          <p:nvPr>
+            <p:ph type="body" idx="1"/>
+          </p:nvPr>
+        </p:nvSpPr>
+        <p:spPr>
+          <a:xfrm>
+            <a:off x="581193" y="4541417"/>
+            <a:ext cx="7989751" cy="600556"/>
+          </a:xfrm>
+        </p:spPr>
+        <p:txBody>
+          <a:bodyPr anchor="t">
+            <a:normAutofit/>
+          </a:bodyPr>
+          <a:lstStyle>
+            <a:lvl1pPr marL="0" indent="0" algn="l">
+              <a:buNone/>
+              <a:defRPr sz="1800" cap="all">
+                <a:solidFill>
+                  <a:schemeClr val="accent2"/>
+                </a:solidFill>
+              </a:defRPr>
+            </a:lvl1pPr>
+            <a:lvl2pPr marL="457200" indent="0">
+              <a:buNone/>
+              <a:defRPr sz="1800">
+                <a:solidFill>
+                  <a:schemeClr val="tx1">
+                    <a:tint val="75000"/>
+                  </a:schemeClr>
+                </a:solidFill>
+              </a:defRPr>
+            </a:lvl2pPr>
+            <a:lvl3pPr marL="914400" indent="0">
+              <a:buNone/>
+              <a:defRPr sz="1600">
+                <a:solidFill>
+                  <a:schemeClr val="tx1">
+                    <a:tint val="75000"/>
+                  </a:schemeClr>
+                </a:solidFill>
+              </a:defRPr>
+            </a:lvl3pPr>
+            <a:lvl4pPr marL="1371600" indent="0">
+              <a:buNone/>
+              <a:defRPr sz="1400">
+                <a:solidFill>
+                  <a:schemeClr val="tx1">
+                    <a:tint val="75000"/>
+                  </a:schemeClr>
+                </a:solidFill>
+              </a:defRPr>
+            </a:lvl4pPr>
+            <a:lvl5pPr marL="1828800" indent="0">
+              <a:buNone/>
+              <a:defRPr sz="1400">
+                <a:solidFill>
+                  <a:schemeClr val="tx1">
+                    <a:tint val="75000"/>
+                  </a:schemeClr>
+                </a:solidFill>
+              </a:defRPr>
+            </a:lvl5pPr>
+            <a:lvl6pPr marL="2286000" indent="0">
+              <a:buNone/>
+              <a:defRPr sz="1400">
+                <a:solidFill>
+                  <a:schemeClr val="tx1">
+                    <a:tint val="75000"/>
+                  </a:schemeClr>
+                </a:solidFill>
+              </a:defRPr>
+            </a:lvl6pPr>
+            <a:lvl7pPr marL="2743200" indent="0">
+              <a:buNone/>
+              <a:defRPr sz="1400">
+                <a:solidFill>
+                  <a:schemeClr val="tx1">
+                    <a:tint val="75000"/>
+                  </a:schemeClr>
+                </a:solidFill>
+              </a:defRPr>
+            </a:lvl7pPr>
+            <a:lvl8pPr marL="3200400" indent="0">
+              <a:buNone/>
+              <a:defRPr sz="1400">
+                <a:solidFill>
+                  <a:schemeClr val="tx1">
+                    <a:tint val="75000"/>
+                  </a:schemeClr>
+                </a:solidFill>
+              </a:defRPr>
+            </a:lvl8pPr>
+            <a:lvl9pPr marL="3657600" indent="0">
+              <a:buNone/>
+              <a:defRPr sz="1400">
+                <a:solidFill>
+                  <a:schemeClr val="tx1">
+                    <a:tint val="75000"/>
+                  </a:schemeClr>
+                </a:solidFill>
+              </a:defRPr>
+            </a:lvl9pPr>
+          </a:lstStyle>
+          <a:p>
+            <a:pPr lvl="0"/>
+            <a:r>
+              <a:rPr lang="en-US"/>
+              <a:t>Click to edit Master text styles</a:t>
+            </a:r>
+          </a:p>
+        </p:txBody>
+      </p:sp>
+      <p:sp>
+        <p:nvSpPr>
+          <p:cNvPr id="4" name="Date Placeholder 3"/>
+          <p:cNvSpPr>
+            <a:spLocks noGrp="1"/>
+          </p:cNvSpPr>
+          <p:nvPr>
+            <p:ph type="dt" sz="half" idx="10"/>
+          </p:nvPr>
+        </p:nvSpPr>
+        <p:spPr>
+          <a:xfrm>
+            <a:off x="5559327" y="5956136"/>
+            <a:ext cx="2133600" cy="365125"/>
+          </a:xfrm>
+          <a:prstGeom prst="rect">
+            <a:avLst/>
+          </a:prstGeom>
+        </p:spPr>
+        <p:txBody>
+          <a:bodyPr/>
+          <a:lstStyle>
+            <a:lvl1pPr>
+              <a:defRPr>
+                <a:solidFill>
+                  <a:schemeClr val="accent1">
+                    <a:lumMod val="75000"/>
+                    <a:lumOff val="25000"/>
+                  </a:schemeClr>
+                </a:solidFill>
+              </a:defRPr>
+            </a:lvl1pPr>
+          </a:lstStyle>
+          <a:p>
+            <a:endParaRPr lang="en-US"/>
+          </a:p>
+        </p:txBody>
+      </p:sp>
+      <p:sp>
+        <p:nvSpPr>
+          <p:cNvPr id="5" name="Footer Placeholder 4"/>
+          <p:cNvSpPr>
+            <a:spLocks noGrp="1"/>
+          </p:cNvSpPr>
+          <p:nvPr>
+            <p:ph type="ftr" sz="quarter" idx="11"/>
+          </p:nvPr>
+        </p:nvSpPr>
+        <p:spPr>
+          <a:xfrm>
+            <a:off x="581192" y="5951810"/>
+            <a:ext cx="4870585" cy="365125"/>
+          </a:xfrm>
+          <a:prstGeom prst="rect">
+            <a:avLst/>
+          </a:prstGeom>
+        </p:spPr>
+        <p:txBody>
+          <a:bodyPr/>
+          <a:lstStyle>
+            <a:lvl1pPr>
+              <a:defRPr>
+                <a:solidFill>
+                  <a:schemeClr val="accent1">
+                    <a:lumMod val="75000"/>
+                    <a:lumOff val="25000"/>
+                  </a:schemeClr>
+                </a:solidFill>
+              </a:defRPr>
+            </a:lvl1pPr>
+          </a:lstStyle>
+          <a:p>
+            <a:r>
+              <a:rPr lang="en-US"/>
+              <a:t>Copyright © 2020 SPIKE Prime Lessons (primelessons.org) CC-BY-NC-SA.  (Last edit: 1/9/2020)</a:t>
+            </a:r>
+            <a:endParaRPr lang="en-US" dirty="0"/>
+          </a:p>
+        </p:txBody>
+      </p:sp>
+      <p:sp>
+        <p:nvSpPr>
+          <p:cNvPr id="6" name="Slide Number Placeholder 5"/>
+          <p:cNvSpPr>
+            <a:spLocks noGrp="1"/>
+          </p:cNvSpPr>
+          <p:nvPr>
+            <p:ph type="sldNum" sz="quarter" idx="12"/>
+          </p:nvPr>
+        </p:nvSpPr>
+        <p:spPr>
+          <a:xfrm>
+            <a:off x="7800476" y="5956136"/>
+            <a:ext cx="770468" cy="365125"/>
+          </a:xfrm>
+          <a:prstGeom prst="rect">
+            <a:avLst/>
+          </a:prstGeom>
+        </p:spPr>
+        <p:txBody>
+          <a:bodyPr/>
+          <a:lstStyle>
+            <a:lvl1pPr>
+              <a:defRPr>
+                <a:solidFill>
+                  <a:schemeClr val="accent1">
+                    <a:lumMod val="75000"/>
+                    <a:lumOff val="25000"/>
+                  </a:schemeClr>
+                </a:solidFill>
+              </a:defRPr>
+            </a:lvl1pPr>
+          </a:lstStyle>
+          <a:p>
+            <a:fld id="{BBD74847-7BE4-4E4D-8159-51DF7B93C616}" type="slidenum">
+              <a:rPr lang="en-US" smtClean="0"/>
+              <a:t>‹#›</a:t>
+            </a:fld>
+            <a:endParaRPr lang="en-US"/>
+          </a:p>
+        </p:txBody>
+      </p:sp>
+      <p:sp>
+        <p:nvSpPr>
+          <p:cNvPr id="11" name="Rectangle 10">
+            <a:extLst>
+              <a:ext uri="{FF2B5EF4-FFF2-40B4-BE49-F238E27FC236}">
+                <a16:creationId xmlns:a16="http://schemas.microsoft.com/office/drawing/2014/main" id="{A9F621E0-AEE7-4799-81EB-EB99ED60C8DF}"/>
+              </a:ext>
+            </a:extLst>
+          </p:cNvPr>
+          <p:cNvSpPr>
+            <a:spLocks noChangeAspect="1"/>
+          </p:cNvSpPr>
+          <p:nvPr/>
+        </p:nvSpPr>
+        <p:spPr>
+          <a:xfrm>
+            <a:off x="142200" y="249101"/>
+            <a:ext cx="8831579" cy="840455"/>
+          </a:xfrm>
+          <a:prstGeom prst="rect">
+            <a:avLst/>
+          </a:prstGeom>
+          <a:solidFill>
+            <a:schemeClr val="accent1"/>
+          </a:solidFill>
+          <a:ln>
+            <a:noFill/>
+          </a:ln>
+          <a:effectLst/>
+        </p:spPr>
+        <p:style>
+          <a:lnRef idx="1">
+            <a:schemeClr val="accent1"/>
+          </a:lnRef>
+          <a:fillRef idx="3">
+            <a:schemeClr val="accent1"/>
+          </a:fillRef>
+          <a:effectRef idx="2">
+            <a:schemeClr val="accent1"/>
+          </a:effectRef>
+          <a:fontRef idx="minor">
+            <a:schemeClr val="lt1"/>
+          </a:fontRef>
+        </p:style>
+        <p:txBody>
+          <a:bodyPr/>
+          <a:lstStyle/>
+          <a:p>
+            <a:endParaRPr lang="en-US" dirty="0"/>
+          </a:p>
+        </p:txBody>
+      </p:sp>
+      <p:sp>
+        <p:nvSpPr>
+          <p:cNvPr id="12" name="Title 1">
+            <a:extLst>
+              <a:ext uri="{FF2B5EF4-FFF2-40B4-BE49-F238E27FC236}">
+                <a16:creationId xmlns:a16="http://schemas.microsoft.com/office/drawing/2014/main" id="{B40FAB25-E17C-4189-8846-137BC28A1EB3}"/>
+              </a:ext>
+            </a:extLst>
+          </p:cNvPr>
+          <p:cNvSpPr txBox="1">
+            <a:spLocks/>
+          </p:cNvSpPr>
+          <p:nvPr/>
+        </p:nvSpPr>
+        <p:spPr>
+          <a:xfrm>
+            <a:off x="175260" y="292975"/>
+            <a:ext cx="8746864" cy="752706"/>
+          </a:xfrm>
+          <a:prstGeom prst="rect">
+            <a:avLst/>
+          </a:prstGeom>
+        </p:spPr>
+        <p:txBody>
+          <a:bodyPr vert="horz" lIns="91440" tIns="45720" rIns="91440" bIns="45720" rtlCol="0" anchor="t">
+            <a:normAutofit/>
+          </a:bodyPr>
+          <a:lstStyle>
+            <a:lvl1pPr algn="l" defTabSz="457200" rtl="0" eaLnBrk="1" latinLnBrk="0" hangingPunct="1">
+              <a:spcBef>
+                <a:spcPct val="0"/>
+              </a:spcBef>
+              <a:buNone/>
+              <a:defRPr sz="2800" b="0" kern="1200" cap="all">
+                <a:solidFill>
+                  <a:schemeClr val="tx1"/>
+                </a:solidFill>
+                <a:latin typeface="+mj-lt"/>
+                <a:ea typeface="+mj-ea"/>
+                <a:cs typeface="+mj-cs"/>
+              </a:defRPr>
+            </a:lvl1pPr>
+            <a:lvl2pPr eaLnBrk="1" hangingPunct="1">
+              <a:defRPr>
+                <a:solidFill>
+                  <a:schemeClr val="tx2"/>
+                </a:solidFill>
+              </a:defRPr>
+            </a:lvl2pPr>
+            <a:lvl3pPr eaLnBrk="1" hangingPunct="1">
+              <a:defRPr>
+                <a:solidFill>
+                  <a:schemeClr val="tx2"/>
+                </a:solidFill>
+              </a:defRPr>
+            </a:lvl3pPr>
+            <a:lvl4pPr eaLnBrk="1" hangingPunct="1">
+              <a:defRPr>
+                <a:solidFill>
+                  <a:schemeClr val="tx2"/>
+                </a:solidFill>
+              </a:defRPr>
+            </a:lvl4pPr>
+            <a:lvl5pPr eaLnBrk="1" hangingPunct="1">
+              <a:defRPr>
+                <a:solidFill>
+                  <a:schemeClr val="tx2"/>
+                </a:solidFill>
+              </a:defRPr>
+            </a:lvl5pPr>
+            <a:lvl6pPr eaLnBrk="1" hangingPunct="1">
+              <a:defRPr>
+                <a:solidFill>
+                  <a:schemeClr val="tx2"/>
+                </a:solidFill>
+              </a:defRPr>
+            </a:lvl6pPr>
+            <a:lvl7pPr eaLnBrk="1" hangingPunct="1">
+              <a:defRPr>
+                <a:solidFill>
+                  <a:schemeClr val="tx2"/>
+                </a:solidFill>
+              </a:defRPr>
+            </a:lvl7pPr>
+            <a:lvl8pPr eaLnBrk="1" hangingPunct="1">
+              <a:defRPr>
+                <a:solidFill>
+                  <a:schemeClr val="tx2"/>
+                </a:solidFill>
+              </a:defRPr>
+            </a:lvl8pPr>
+            <a:lvl9pPr eaLnBrk="1" hangingPunct="1">
+              <a:defRPr>
+                <a:solidFill>
+                  <a:schemeClr val="tx2"/>
+                </a:solidFill>
+              </a:defRPr>
+            </a:lvl9pPr>
+          </a:lstStyle>
+          <a:p>
+            <a:r>
+              <a:rPr lang="en-US"/>
+              <a:t>Click to edit Master title style</a:t>
+            </a:r>
+            <a:endParaRPr lang="en-US" dirty="0"/>
+          </a:p>
+        </p:txBody>
+      </p:sp>
+      <p:sp>
+        <p:nvSpPr>
+          <p:cNvPr id="10" name="Rectangle 9">
+            <a:extLst>
+              <a:ext uri="{FF2B5EF4-FFF2-40B4-BE49-F238E27FC236}">
+                <a16:creationId xmlns:a16="http://schemas.microsoft.com/office/drawing/2014/main" id="{19990740-6E34-794B-87FB-277AE5B44550}"/>
+              </a:ext>
+            </a:extLst>
+          </p:cNvPr>
+          <p:cNvSpPr>
+            <a:spLocks noChangeAspect="1"/>
+          </p:cNvSpPr>
+          <p:nvPr userDrawn="1"/>
+        </p:nvSpPr>
+        <p:spPr>
+          <a:xfrm>
+            <a:off x="142200" y="249101"/>
+            <a:ext cx="8831579" cy="840455"/>
+          </a:xfrm>
+          <a:prstGeom prst="rect">
+            <a:avLst/>
+          </a:prstGeom>
+          <a:solidFill>
+            <a:schemeClr val="accent1"/>
+          </a:solidFill>
+          <a:ln>
+            <a:noFill/>
+          </a:ln>
+          <a:effectLst/>
+        </p:spPr>
+        <p:style>
+          <a:lnRef idx="1">
+            <a:schemeClr val="accent1"/>
+          </a:lnRef>
+          <a:fillRef idx="3">
+            <a:schemeClr val="accent1"/>
+          </a:fillRef>
+          <a:effectRef idx="2">
+            <a:schemeClr val="accent1"/>
+          </a:effectRef>
+          <a:fontRef idx="minor">
+            <a:schemeClr val="lt1"/>
+          </a:fontRef>
+        </p:style>
+        <p:txBody>
+          <a:bodyPr/>
+          <a:lstStyle/>
+          <a:p>
+            <a:endParaRPr lang="en-US" dirty="0"/>
+          </a:p>
+        </p:txBody>
+      </p:sp>
+      <p:sp>
+        <p:nvSpPr>
+          <p:cNvPr id="13" name="Title 1">
+            <a:extLst>
+              <a:ext uri="{FF2B5EF4-FFF2-40B4-BE49-F238E27FC236}">
+                <a16:creationId xmlns:a16="http://schemas.microsoft.com/office/drawing/2014/main" id="{B231130B-425C-5641-B405-BB17815E18B9}"/>
+              </a:ext>
+            </a:extLst>
+          </p:cNvPr>
+          <p:cNvSpPr txBox="1">
+            <a:spLocks/>
+          </p:cNvSpPr>
+          <p:nvPr userDrawn="1"/>
+        </p:nvSpPr>
+        <p:spPr>
+          <a:xfrm>
+            <a:off x="175260" y="292975"/>
+            <a:ext cx="8746864" cy="752706"/>
+          </a:xfrm>
+          <a:prstGeom prst="rect">
+            <a:avLst/>
+          </a:prstGeom>
+        </p:spPr>
+        <p:txBody>
+          <a:bodyPr vert="horz" lIns="91440" tIns="45720" rIns="91440" bIns="45720" rtlCol="0" anchor="t">
+            <a:normAutofit/>
+          </a:bodyPr>
+          <a:lstStyle>
+            <a:lvl1pPr algn="l" defTabSz="457200" rtl="0" eaLnBrk="1" latinLnBrk="0" hangingPunct="1">
+              <a:spcBef>
+                <a:spcPct val="0"/>
+              </a:spcBef>
+              <a:buNone/>
+              <a:defRPr sz="2800" b="0" kern="1200" cap="all">
+                <a:solidFill>
+                  <a:schemeClr val="tx1"/>
+                </a:solidFill>
+                <a:latin typeface="+mj-lt"/>
+                <a:ea typeface="+mj-ea"/>
+                <a:cs typeface="+mj-cs"/>
+              </a:defRPr>
+            </a:lvl1pPr>
+            <a:lvl2pPr eaLnBrk="1" hangingPunct="1">
+              <a:defRPr>
+                <a:solidFill>
+                  <a:schemeClr val="tx2"/>
+                </a:solidFill>
+              </a:defRPr>
+            </a:lvl2pPr>
+            <a:lvl3pPr eaLnBrk="1" hangingPunct="1">
+              <a:defRPr>
+                <a:solidFill>
+                  <a:schemeClr val="tx2"/>
+                </a:solidFill>
+              </a:defRPr>
+            </a:lvl3pPr>
+            <a:lvl4pPr eaLnBrk="1" hangingPunct="1">
+              <a:defRPr>
+                <a:solidFill>
+                  <a:schemeClr val="tx2"/>
+                </a:solidFill>
+              </a:defRPr>
+            </a:lvl4pPr>
+            <a:lvl5pPr eaLnBrk="1" hangingPunct="1">
+              <a:defRPr>
+                <a:solidFill>
+                  <a:schemeClr val="tx2"/>
+                </a:solidFill>
+              </a:defRPr>
+            </a:lvl5pPr>
+            <a:lvl6pPr eaLnBrk="1" hangingPunct="1">
+              <a:defRPr>
+                <a:solidFill>
+                  <a:schemeClr val="tx2"/>
+                </a:solidFill>
+              </a:defRPr>
+            </a:lvl6pPr>
+            <a:lvl7pPr eaLnBrk="1" hangingPunct="1">
+              <a:defRPr>
+                <a:solidFill>
+                  <a:schemeClr val="tx2"/>
+                </a:solidFill>
+              </a:defRPr>
+            </a:lvl7pPr>
+            <a:lvl8pPr eaLnBrk="1" hangingPunct="1">
+              <a:defRPr>
+                <a:solidFill>
+                  <a:schemeClr val="tx2"/>
+                </a:solidFill>
+              </a:defRPr>
+            </a:lvl8pPr>
+            <a:lvl9pPr eaLnBrk="1" hangingPunct="1">
+              <a:defRPr>
+                <a:solidFill>
+                  <a:schemeClr val="tx2"/>
+                </a:solidFill>
+              </a:defRPr>
+            </a:lvl9pPr>
+          </a:lstStyle>
+          <a:p>
+            <a:r>
+              <a:rPr lang="en-US"/>
+              <a:t>Click to edit Master title style</a:t>
+            </a:r>
+            <a:endParaRPr lang="en-US" dirty="0"/>
+          </a:p>
+        </p:txBody>
+      </p:sp>
+    </p:spTree>
+    <p:extLst>
+      <p:ext uri="{BB962C8B-B14F-4D97-AF65-F5344CB8AC3E}">
+        <p14:creationId xmlns:p14="http://schemas.microsoft.com/office/powerpoint/2010/main" val="3054741833"/>
+      </p:ext>
+    </p:extLst>
+  </p:cSld>
+  <p:clrMapOvr>
+    <a:masterClrMapping/>
+  </p:clrMapOvr>
+</p:sldLayout>
+</file>
+
+<file path=ppt/slideLayouts/slideLayout4.xml><?xml version="1.0" encoding="utf-8"?>
+<p:sldLayout xmlns:a="http://schemas.openxmlformats.org/drawingml/2006/main" xmlns:r="http://schemas.openxmlformats.org/officeDocument/2006/relationships" xmlns:p="http://schemas.openxmlformats.org/presentationml/2006/main" preserve="1">
+  <p:cSld name="Two Content">
+    <p:spTree>
+      <p:nvGrpSpPr>
+        <p:cNvPr id="1" name=""/>
+        <p:cNvGrpSpPr/>
+        <p:nvPr/>
+      </p:nvGrpSpPr>
+      <p:grpSpPr>
+        <a:xfrm>
+          <a:off x="0" y="0"/>
+          <a:ext cx="0" cy="0"/>
+          <a:chOff x="0" y="0"/>
+          <a:chExt cx="0" cy="0"/>
+        </a:xfrm>
+      </p:grpSpPr>
+      <p:sp>
+        <p:nvSpPr>
+          <p:cNvPr id="3" name="Content Placeholder 2"/>
+          <p:cNvSpPr>
+            <a:spLocks noGrp="1"/>
+          </p:cNvSpPr>
+          <p:nvPr>
+            <p:ph sz="half" idx="1"/>
+          </p:nvPr>
+        </p:nvSpPr>
+        <p:spPr>
+          <a:xfrm>
+            <a:off x="142200" y="1174924"/>
+            <a:ext cx="4185204" cy="4967864"/>
+          </a:xfrm>
+        </p:spPr>
+        <p:txBody>
+          <a:bodyPr>
+            <a:normAutofit/>
+          </a:bodyPr>
+          <a:lstStyle>
+            <a:lvl1pPr algn="l">
+              <a:defRPr/>
+            </a:lvl1pPr>
+            <a:lvl2pPr algn="l">
+              <a:defRPr/>
+            </a:lvl2pPr>
+            <a:lvl3pPr algn="l">
+              <a:defRPr/>
+            </a:lvl3pPr>
+            <a:lvl4pPr algn="l">
+              <a:defRPr/>
+            </a:lvl4pPr>
+            <a:lvl5pPr algn="l">
+              <a:defRPr/>
+            </a:lvl5pPr>
+          </a:lstStyle>
+          <a:p>
+            <a:pPr lvl="0"/>
+            <a:r>
+              <a:rPr lang="en-US"/>
+              <a:t>Click to edit Master text styles</a:t>
+            </a:r>
+          </a:p>
+          <a:p>
+            <a:pPr lvl="1"/>
+            <a:r>
+              <a:rPr lang="en-US"/>
+              <a:t>Second level</a:t>
+            </a:r>
+          </a:p>
+          <a:p>
+            <a:pPr lvl="2"/>
+            <a:r>
+              <a:rPr lang="en-US"/>
+              <a:t>Third level</a:t>
+            </a:r>
+          </a:p>
+          <a:p>
+            <a:pPr lvl="3"/>
+            <a:r>
+              <a:rPr lang="en-US"/>
+              <a:t>Fourth level</a:t>
+            </a:r>
+          </a:p>
+          <a:p>
+            <a:pPr lvl="4"/>
+            <a:r>
+              <a:rPr lang="en-US"/>
+              <a:t>Fifth level</a:t>
+            </a:r>
+            <a:endParaRPr lang="en-US" dirty="0"/>
+          </a:p>
+        </p:txBody>
+      </p:sp>
+      <p:sp>
+        <p:nvSpPr>
+          <p:cNvPr id="4" name="Content Placeholder 3"/>
+          <p:cNvSpPr>
+            <a:spLocks noGrp="1"/>
+          </p:cNvSpPr>
+          <p:nvPr>
+            <p:ph sz="half" idx="2"/>
+          </p:nvPr>
+        </p:nvSpPr>
+        <p:spPr>
+          <a:xfrm>
+            <a:off x="4757752" y="1177439"/>
+            <a:ext cx="4226411" cy="4967864"/>
+          </a:xfrm>
+        </p:spPr>
+        <p:txBody>
+          <a:bodyPr>
+            <a:normAutofit/>
+          </a:bodyPr>
+          <a:lstStyle>
+            <a:lvl1pPr algn="l">
+              <a:defRPr/>
+            </a:lvl1pPr>
+            <a:lvl2pPr algn="l">
+              <a:defRPr/>
+            </a:lvl2pPr>
+            <a:lvl3pPr algn="l">
+              <a:defRPr/>
+            </a:lvl3pPr>
+            <a:lvl4pPr algn="l">
+              <a:defRPr/>
+            </a:lvl4pPr>
+            <a:lvl5pPr algn="l">
+              <a:defRPr/>
+            </a:lvl5pPr>
+          </a:lstStyle>
+          <a:p>
+            <a:pPr lvl="0"/>
+            <a:r>
+              <a:rPr lang="en-US"/>
+              <a:t>Click to edit Master text styles</a:t>
+            </a:r>
+          </a:p>
+          <a:p>
+            <a:pPr lvl="1"/>
+            <a:r>
+              <a:rPr lang="en-US"/>
+              <a:t>Second level</a:t>
+            </a:r>
+          </a:p>
+          <a:p>
+            <a:pPr lvl="2"/>
+            <a:r>
+              <a:rPr lang="en-US"/>
+              <a:t>Third level</a:t>
+            </a:r>
+          </a:p>
+          <a:p>
+            <a:pPr lvl="3"/>
+            <a:r>
+              <a:rPr lang="en-US"/>
+              <a:t>Fourth level</a:t>
+            </a:r>
+          </a:p>
+          <a:p>
+            <a:pPr lvl="4"/>
+            <a:r>
+              <a:rPr lang="en-US"/>
+              <a:t>Fifth level</a:t>
+            </a:r>
+            <a:endParaRPr lang="en-US" dirty="0"/>
+          </a:p>
+        </p:txBody>
+      </p:sp>
+      <p:sp>
+        <p:nvSpPr>
+          <p:cNvPr id="9" name="Footer Placeholder 4">
+            <a:extLst>
+              <a:ext uri="{FF2B5EF4-FFF2-40B4-BE49-F238E27FC236}">
+                <a16:creationId xmlns:a16="http://schemas.microsoft.com/office/drawing/2014/main" id="{593A4B09-24AC-454E-8A0C-D31EDE125503}"/>
+              </a:ext>
+            </a:extLst>
+          </p:cNvPr>
+          <p:cNvSpPr>
+            <a:spLocks noGrp="1"/>
+          </p:cNvSpPr>
+          <p:nvPr>
+            <p:ph type="ftr" sz="quarter" idx="11"/>
+          </p:nvPr>
+        </p:nvSpPr>
+        <p:spPr>
+          <a:xfrm>
+            <a:off x="88409" y="6266485"/>
+            <a:ext cx="4870585" cy="365125"/>
+          </a:xfrm>
+          <a:prstGeom prst="rect">
+            <a:avLst/>
+          </a:prstGeom>
+        </p:spPr>
+        <p:txBody>
+          <a:bodyPr/>
+          <a:lstStyle/>
+          <a:p>
+            <a:r>
+              <a:rPr lang="en-US"/>
+              <a:t>Copyright © 2020 SPIKE Prime Lessons (primelessons.org) CC-BY-NC-SA.  (Last edit: 1/9/2020)</a:t>
+            </a:r>
+            <a:endParaRPr lang="en-US" dirty="0"/>
+          </a:p>
+        </p:txBody>
+      </p:sp>
+      <p:sp>
+        <p:nvSpPr>
+          <p:cNvPr id="10" name="Slide Number Placeholder 5">
+            <a:extLst>
+              <a:ext uri="{FF2B5EF4-FFF2-40B4-BE49-F238E27FC236}">
+                <a16:creationId xmlns:a16="http://schemas.microsoft.com/office/drawing/2014/main" id="{24EC4D01-901A-4258-A65D-27A4329F0F2D}"/>
+              </a:ext>
+            </a:extLst>
+          </p:cNvPr>
+          <p:cNvSpPr>
+            <a:spLocks noGrp="1"/>
+          </p:cNvSpPr>
+          <p:nvPr>
+            <p:ph type="sldNum" sz="quarter" idx="12"/>
+          </p:nvPr>
+        </p:nvSpPr>
+        <p:spPr>
+          <a:xfrm>
+            <a:off x="8236372" y="6280641"/>
+            <a:ext cx="770468" cy="365125"/>
+          </a:xfrm>
+          <a:prstGeom prst="rect">
+            <a:avLst/>
+          </a:prstGeom>
+        </p:spPr>
+        <p:txBody>
+          <a:bodyPr/>
+          <a:lstStyle/>
+          <a:p>
+            <a:fld id="{BBD74847-7BE4-4E4D-8159-51DF7B93C616}" type="slidenum">
+              <a:rPr lang="en-US" smtClean="0"/>
+              <a:t>‹#›</a:t>
+            </a:fld>
+            <a:endParaRPr lang="en-US"/>
+          </a:p>
+        </p:txBody>
+      </p:sp>
+      <p:cxnSp>
+        <p:nvCxnSpPr>
+          <p:cNvPr id="11" name="Straight Connector 10">
+            <a:extLst>
+              <a:ext uri="{FF2B5EF4-FFF2-40B4-BE49-F238E27FC236}">
+                <a16:creationId xmlns:a16="http://schemas.microsoft.com/office/drawing/2014/main" id="{BE3A7F9C-E99E-44C1-89A0-A6ED28ADCEF0}"/>
+              </a:ext>
+            </a:extLst>
+          </p:cNvPr>
+          <p:cNvCxnSpPr/>
+          <p:nvPr/>
+        </p:nvCxnSpPr>
+        <p:spPr>
+          <a:xfrm>
+            <a:off x="175260" y="6316935"/>
+            <a:ext cx="8831580" cy="0"/>
+          </a:xfrm>
+          <a:prstGeom prst="line">
+            <a:avLst/>
+          </a:prstGeom>
+        </p:spPr>
+        <p:style>
+          <a:lnRef idx="1">
+            <a:schemeClr val="dk1"/>
+          </a:lnRef>
+          <a:fillRef idx="0">
+            <a:schemeClr val="dk1"/>
+          </a:fillRef>
+          <a:effectRef idx="0">
+            <a:schemeClr val="dk1"/>
+          </a:effectRef>
+          <a:fontRef idx="minor">
+            <a:schemeClr val="tx1"/>
+          </a:fontRef>
+        </p:style>
+      </p:cxnSp>
+      <p:sp>
+        <p:nvSpPr>
+          <p:cNvPr id="15" name="Rectangle 14">
+            <a:extLst>
+              <a:ext uri="{FF2B5EF4-FFF2-40B4-BE49-F238E27FC236}">
+                <a16:creationId xmlns:a16="http://schemas.microsoft.com/office/drawing/2014/main" id="{8F86C8F5-3CD8-41C6-A6C4-EF53AE7214CB}"/>
+              </a:ext>
+            </a:extLst>
+          </p:cNvPr>
+          <p:cNvSpPr>
+            <a:spLocks noChangeAspect="1"/>
+          </p:cNvSpPr>
+          <p:nvPr/>
+        </p:nvSpPr>
+        <p:spPr>
+          <a:xfrm>
+            <a:off x="142200" y="249101"/>
+            <a:ext cx="8831579" cy="840455"/>
+          </a:xfrm>
+          <a:prstGeom prst="rect">
+            <a:avLst/>
+          </a:prstGeom>
+          <a:solidFill>
+            <a:schemeClr val="accent1"/>
+          </a:solidFill>
+          <a:ln>
+            <a:noFill/>
+          </a:ln>
+          <a:effectLst/>
+        </p:spPr>
+        <p:style>
+          <a:lnRef idx="1">
+            <a:schemeClr val="accent1"/>
+          </a:lnRef>
+          <a:fillRef idx="3">
+            <a:schemeClr val="accent1"/>
+          </a:fillRef>
+          <a:effectRef idx="2">
+            <a:schemeClr val="accent1"/>
+          </a:effectRef>
+          <a:fontRef idx="minor">
+            <a:schemeClr val="lt1"/>
+          </a:fontRef>
+        </p:style>
+        <p:txBody>
+          <a:bodyPr/>
+          <a:lstStyle/>
+          <a:p>
+            <a:endParaRPr lang="en-US" dirty="0"/>
+          </a:p>
+        </p:txBody>
+      </p:sp>
+      <p:sp>
+        <p:nvSpPr>
+          <p:cNvPr id="16" name="Title 1">
+            <a:extLst>
+              <a:ext uri="{FF2B5EF4-FFF2-40B4-BE49-F238E27FC236}">
+                <a16:creationId xmlns:a16="http://schemas.microsoft.com/office/drawing/2014/main" id="{389BF07E-558D-420A-943A-465BCC22754A}"/>
+              </a:ext>
+            </a:extLst>
+          </p:cNvPr>
+          <p:cNvSpPr>
+            <a:spLocks noGrp="1"/>
+          </p:cNvSpPr>
+          <p:nvPr>
+            <p:ph type="title"/>
+          </p:nvPr>
+        </p:nvSpPr>
+        <p:spPr>
+          <a:xfrm>
+            <a:off x="175260" y="292975"/>
+            <a:ext cx="8746864" cy="752706"/>
+          </a:xfrm>
+        </p:spPr>
+        <p:txBody>
+          <a:bodyPr anchor="t"/>
+          <a:lstStyle>
+            <a:lvl1pPr>
+              <a:defRPr>
+                <a:solidFill>
+                  <a:schemeClr val="tx1"/>
+                </a:solidFill>
+              </a:defRPr>
+            </a:lvl1pPr>
+          </a:lstStyle>
+          <a:p>
+            <a:r>
+              <a:rPr lang="en-US"/>
+              <a:t>Click to edit Master title style</a:t>
+            </a:r>
+            <a:endParaRPr lang="en-US" dirty="0"/>
+          </a:p>
+        </p:txBody>
+      </p:sp>
+      <p:cxnSp>
+        <p:nvCxnSpPr>
+          <p:cNvPr id="12" name="Straight Connector 11">
+            <a:extLst>
+              <a:ext uri="{FF2B5EF4-FFF2-40B4-BE49-F238E27FC236}">
+                <a16:creationId xmlns:a16="http://schemas.microsoft.com/office/drawing/2014/main" id="{BF216FFE-8B58-4345-B1AF-C21B754EE97C}"/>
+              </a:ext>
+            </a:extLst>
+          </p:cNvPr>
+          <p:cNvCxnSpPr/>
+          <p:nvPr userDrawn="1"/>
+        </p:nvCxnSpPr>
+        <p:spPr>
+          <a:xfrm>
+            <a:off x="175260" y="6316935"/>
+            <a:ext cx="8831580" cy="0"/>
+          </a:xfrm>
+          <a:prstGeom prst="line">
+            <a:avLst/>
+          </a:prstGeom>
+        </p:spPr>
+        <p:style>
+          <a:lnRef idx="1">
+            <a:schemeClr val="dk1"/>
+          </a:lnRef>
+          <a:fillRef idx="0">
+            <a:schemeClr val="dk1"/>
+          </a:fillRef>
+          <a:effectRef idx="0">
+            <a:schemeClr val="dk1"/>
+          </a:effectRef>
+          <a:fontRef idx="minor">
+            <a:schemeClr val="tx1"/>
+          </a:fontRef>
+        </p:style>
+      </p:cxnSp>
+      <p:sp>
+        <p:nvSpPr>
+          <p:cNvPr id="13" name="Rectangle 12">
+            <a:extLst>
+              <a:ext uri="{FF2B5EF4-FFF2-40B4-BE49-F238E27FC236}">
+                <a16:creationId xmlns:a16="http://schemas.microsoft.com/office/drawing/2014/main" id="{BAFE7FE7-59DC-FF40-8E06-663AC6293F6E}"/>
+              </a:ext>
+            </a:extLst>
+          </p:cNvPr>
+          <p:cNvSpPr>
+            <a:spLocks noChangeAspect="1"/>
+          </p:cNvSpPr>
+          <p:nvPr userDrawn="1"/>
+        </p:nvSpPr>
+        <p:spPr>
+          <a:xfrm>
+            <a:off x="142200" y="249101"/>
+            <a:ext cx="8831579" cy="840455"/>
+          </a:xfrm>
+          <a:prstGeom prst="rect">
+            <a:avLst/>
+          </a:prstGeom>
+          <a:solidFill>
+            <a:schemeClr val="accent1"/>
+          </a:solidFill>
+          <a:ln>
+            <a:noFill/>
+          </a:ln>
+          <a:effectLst/>
+        </p:spPr>
+        <p:style>
+          <a:lnRef idx="1">
+            <a:schemeClr val="accent1"/>
+          </a:lnRef>
+          <a:fillRef idx="3">
+            <a:schemeClr val="accent1"/>
+          </a:fillRef>
+          <a:effectRef idx="2">
+            <a:schemeClr val="accent1"/>
+          </a:effectRef>
+          <a:fontRef idx="minor">
+            <a:schemeClr val="lt1"/>
+          </a:fontRef>
+        </p:style>
+        <p:txBody>
+          <a:bodyPr/>
+          <a:lstStyle/>
+          <a:p>
+            <a:endParaRPr lang="en-US" dirty="0"/>
+          </a:p>
+        </p:txBody>
+      </p:sp>
+    </p:spTree>
+    <p:extLst>
+      <p:ext uri="{BB962C8B-B14F-4D97-AF65-F5344CB8AC3E}">
+        <p14:creationId xmlns:p14="http://schemas.microsoft.com/office/powerpoint/2010/main" val="3677216003"/>
+      </p:ext>
+    </p:extLst>
+  </p:cSld>
+  <p:clrMapOvr>
+    <a:masterClrMapping/>
+  </p:clrMapOvr>
+</p:sldLayout>
+</file>
+
+<file path=ppt/slideLayouts/slideLayout5.xml><?xml version="1.0" encoding="utf-8"?>
+<p:sldLayout xmlns:a="http://schemas.openxmlformats.org/drawingml/2006/main" xmlns:r="http://schemas.openxmlformats.org/officeDocument/2006/relationships" xmlns:p="http://schemas.openxmlformats.org/presentationml/2006/main" preserve="1">
+  <p:cSld name="Comparison">
+    <p:spTree>
+      <p:nvGrpSpPr>
+        <p:cNvPr id="1" name=""/>
+        <p:cNvGrpSpPr/>
+        <p:nvPr/>
+      </p:nvGrpSpPr>
+      <p:grpSpPr>
+        <a:xfrm>
+          <a:off x="0" y="0"/>
+          <a:ext cx="0" cy="0"/>
+          <a:chOff x="0" y="0"/>
+          <a:chExt cx="0" cy="0"/>
+        </a:xfrm>
+      </p:grpSpPr>
+      <p:sp>
+        <p:nvSpPr>
+          <p:cNvPr id="3" name="Text Placeholder 2"/>
+          <p:cNvSpPr>
+            <a:spLocks noGrp="1"/>
+          </p:cNvSpPr>
+          <p:nvPr>
+            <p:ph type="body" idx="1"/>
+          </p:nvPr>
+        </p:nvSpPr>
+        <p:spPr>
+          <a:xfrm>
+            <a:off x="887219" y="2228003"/>
+            <a:ext cx="3593500" cy="576262"/>
+          </a:xfrm>
+        </p:spPr>
+        <p:txBody>
+          <a:bodyPr anchor="b">
+            <a:noAutofit/>
+          </a:bodyPr>
+          <a:lstStyle>
+            <a:lvl1pPr marL="0" indent="0">
+              <a:buNone/>
+              <a:defRPr sz="2200" b="0">
+                <a:solidFill>
+                  <a:schemeClr val="accent2"/>
+                </a:solidFill>
+              </a:defRPr>
+            </a:lvl1pPr>
+            <a:lvl2pPr marL="457200" indent="0">
+              <a:buNone/>
+              <a:defRPr sz="2000" b="1"/>
+            </a:lvl2pPr>
+            <a:lvl3pPr marL="914400" indent="0">
+              <a:buNone/>
+              <a:defRPr sz="1800" b="1"/>
+            </a:lvl3pPr>
+            <a:lvl4pPr marL="1371600" indent="0">
+              <a:buNone/>
+              <a:defRPr sz="1600" b="1"/>
+            </a:lvl4pPr>
+            <a:lvl5pPr marL="1828800" indent="0">
+              <a:buNone/>
+              <a:defRPr sz="1600" b="1"/>
+            </a:lvl5pPr>
+            <a:lvl6pPr marL="2286000" indent="0">
+              <a:buNone/>
+              <a:defRPr sz="1600" b="1"/>
+            </a:lvl6pPr>
+            <a:lvl7pPr marL="2743200" indent="0">
+              <a:buNone/>
+              <a:defRPr sz="1600" b="1"/>
+            </a:lvl7pPr>
+            <a:lvl8pPr marL="3200400" indent="0">
+              <a:buNone/>
+              <a:defRPr sz="1600" b="1"/>
+            </a:lvl8pPr>
+            <a:lvl9pPr marL="3657600" indent="0">
+              <a:buNone/>
+              <a:defRPr sz="1600" b="1"/>
+            </a:lvl9pPr>
+          </a:lstStyle>
+          <a:p>
+            <a:pPr lvl="0"/>
+            <a:r>
+              <a:rPr lang="en-US"/>
+              <a:t>Click to edit Master text styles</a:t>
+            </a:r>
+          </a:p>
+        </p:txBody>
+      </p:sp>
+      <p:sp>
+        <p:nvSpPr>
+          <p:cNvPr id="4" name="Content Placeholder 3"/>
+          <p:cNvSpPr>
+            <a:spLocks noGrp="1"/>
+          </p:cNvSpPr>
+          <p:nvPr>
+            <p:ph sz="half" idx="2"/>
+          </p:nvPr>
+        </p:nvSpPr>
+        <p:spPr>
+          <a:xfrm>
+            <a:off x="581192" y="2926051"/>
+            <a:ext cx="3899527" cy="2934999"/>
+          </a:xfrm>
+        </p:spPr>
+        <p:txBody>
+          <a:bodyPr anchor="t">
+            <a:normAutofit/>
+          </a:bodyPr>
+          <a:lstStyle/>
+          <a:p>
+            <a:pPr lvl="0"/>
+            <a:r>
+              <a:rPr lang="en-US"/>
+              <a:t>Click to edit Master text styles</a:t>
+            </a:r>
+          </a:p>
+          <a:p>
+            <a:pPr lvl="1"/>
+            <a:r>
+              <a:rPr lang="en-US"/>
+              <a:t>Second level</a:t>
+            </a:r>
+          </a:p>
+          <a:p>
+            <a:pPr lvl="2"/>
+            <a:r>
+              <a:rPr lang="en-US"/>
+              <a:t>Third level</a:t>
+            </a:r>
+          </a:p>
+          <a:p>
+            <a:pPr lvl="3"/>
+            <a:r>
+              <a:rPr lang="en-US"/>
+              <a:t>Fourth level</a:t>
+            </a:r>
+          </a:p>
+          <a:p>
+            <a:pPr lvl="4"/>
+            <a:r>
+              <a:rPr lang="en-US"/>
+              <a:t>Fifth level</a:t>
+            </a:r>
+            <a:endParaRPr lang="en-US" dirty="0"/>
+          </a:p>
+        </p:txBody>
+      </p:sp>
+      <p:sp>
+        <p:nvSpPr>
+          <p:cNvPr id="5" name="Text Placeholder 4"/>
+          <p:cNvSpPr>
+            <a:spLocks noGrp="1"/>
+          </p:cNvSpPr>
+          <p:nvPr>
+            <p:ph type="body" sz="quarter" idx="3"/>
+          </p:nvPr>
+        </p:nvSpPr>
+        <p:spPr>
+          <a:xfrm>
+            <a:off x="4969308" y="2228003"/>
+            <a:ext cx="3601635" cy="576262"/>
+          </a:xfrm>
+        </p:spPr>
+        <p:txBody>
+          <a:bodyPr anchor="b">
+            <a:noAutofit/>
+          </a:bodyPr>
+          <a:lstStyle>
+            <a:lvl1pPr marL="0" indent="0">
+              <a:buNone/>
+              <a:defRPr sz="2200" b="0">
+                <a:solidFill>
+                  <a:schemeClr val="accent2"/>
+                </a:solidFill>
+              </a:defRPr>
+            </a:lvl1pPr>
+            <a:lvl2pPr marL="457200" indent="0">
+              <a:buNone/>
+              <a:defRPr sz="2000" b="1"/>
+            </a:lvl2pPr>
+            <a:lvl3pPr marL="914400" indent="0">
+              <a:buNone/>
+              <a:defRPr sz="1800" b="1"/>
+            </a:lvl3pPr>
+            <a:lvl4pPr marL="1371600" indent="0">
+              <a:buNone/>
+              <a:defRPr sz="1600" b="1"/>
+            </a:lvl4pPr>
+            <a:lvl5pPr marL="1828800" indent="0">
+              <a:buNone/>
+              <a:defRPr sz="1600" b="1"/>
+            </a:lvl5pPr>
+            <a:lvl6pPr marL="2286000" indent="0">
+              <a:buNone/>
+              <a:defRPr sz="1600" b="1"/>
+            </a:lvl6pPr>
+            <a:lvl7pPr marL="2743200" indent="0">
+              <a:buNone/>
+              <a:defRPr sz="1600" b="1"/>
+            </a:lvl7pPr>
+            <a:lvl8pPr marL="3200400" indent="0">
+              <a:buNone/>
+              <a:defRPr sz="1600" b="1"/>
+            </a:lvl8pPr>
+            <a:lvl9pPr marL="3657600" indent="0">
+              <a:buNone/>
+              <a:defRPr sz="1600" b="1"/>
+            </a:lvl9pPr>
+          </a:lstStyle>
+          <a:p>
+            <a:pPr lvl="0"/>
+            <a:r>
+              <a:rPr lang="en-US"/>
+              <a:t>Click to edit Master text styles</a:t>
+            </a:r>
+          </a:p>
+        </p:txBody>
+      </p:sp>
+      <p:sp>
+        <p:nvSpPr>
+          <p:cNvPr id="6" name="Content Placeholder 5"/>
+          <p:cNvSpPr>
+            <a:spLocks noGrp="1"/>
+          </p:cNvSpPr>
+          <p:nvPr>
+            <p:ph sz="quarter" idx="4"/>
+          </p:nvPr>
+        </p:nvSpPr>
+        <p:spPr>
+          <a:xfrm>
+            <a:off x="4663282" y="2926051"/>
+            <a:ext cx="3907662" cy="2934999"/>
+          </a:xfrm>
+        </p:spPr>
+        <p:txBody>
+          <a:bodyPr anchor="t">
+            <a:normAutofit/>
+          </a:bodyPr>
+          <a:lstStyle/>
+          <a:p>
+            <a:pPr lvl="0"/>
+            <a:r>
+              <a:rPr lang="en-US"/>
+              <a:t>Click to edit Master text styles</a:t>
+            </a:r>
+          </a:p>
+          <a:p>
+            <a:pPr lvl="1"/>
+            <a:r>
+              <a:rPr lang="en-US"/>
+              <a:t>Second level</a:t>
+            </a:r>
+          </a:p>
+          <a:p>
+            <a:pPr lvl="2"/>
+            <a:r>
+              <a:rPr lang="en-US"/>
+              <a:t>Third level</a:t>
+            </a:r>
+          </a:p>
+          <a:p>
+            <a:pPr lvl="3"/>
+            <a:r>
+              <a:rPr lang="en-US"/>
+              <a:t>Fourth level</a:t>
+            </a:r>
+          </a:p>
+          <a:p>
+            <a:pPr lvl="4"/>
+            <a:r>
+              <a:rPr lang="en-US"/>
+              <a:t>Fifth level</a:t>
+            </a:r>
+            <a:endParaRPr lang="en-US" dirty="0"/>
+          </a:p>
+        </p:txBody>
+      </p:sp>
+      <p:sp>
+        <p:nvSpPr>
+          <p:cNvPr id="7" name="Date Placeholder 6"/>
+          <p:cNvSpPr>
+            <a:spLocks noGrp="1"/>
+          </p:cNvSpPr>
+          <p:nvPr>
+            <p:ph type="dt" sz="half" idx="10"/>
+          </p:nvPr>
+        </p:nvSpPr>
+        <p:spPr>
+          <a:xfrm>
+            <a:off x="5559327" y="5956136"/>
+            <a:ext cx="2133600" cy="365125"/>
+          </a:xfrm>
+          <a:prstGeom prst="rect">
+            <a:avLst/>
+          </a:prstGeom>
+        </p:spPr>
+        <p:txBody>
+          <a:bodyPr/>
+          <a:lstStyle/>
+          <a:p>
+            <a:endParaRPr lang="en-US"/>
+          </a:p>
+        </p:txBody>
+      </p:sp>
+      <p:sp>
+        <p:nvSpPr>
+          <p:cNvPr id="8" name="Footer Placeholder 7"/>
+          <p:cNvSpPr>
+            <a:spLocks noGrp="1"/>
+          </p:cNvSpPr>
+          <p:nvPr>
+            <p:ph type="ftr" sz="quarter" idx="11"/>
+          </p:nvPr>
+        </p:nvSpPr>
+        <p:spPr>
+          <a:xfrm>
+            <a:off x="581192" y="5951810"/>
+            <a:ext cx="4870585" cy="365125"/>
+          </a:xfrm>
+          <a:prstGeom prst="rect">
+            <a:avLst/>
+          </a:prstGeom>
+        </p:spPr>
+        <p:txBody>
+          <a:bodyPr/>
+          <a:lstStyle/>
+          <a:p>
+            <a:r>
+              <a:rPr lang="en-US"/>
+              <a:t>Copyright © 2020 SPIKE Prime Lessons (primelessons.org) CC-BY-NC-SA.  (Last edit: 1/9/2020)</a:t>
+            </a:r>
+            <a:endParaRPr lang="en-US" dirty="0"/>
+          </a:p>
+        </p:txBody>
+      </p:sp>
+      <p:sp>
+        <p:nvSpPr>
+          <p:cNvPr id="9" name="Slide Number Placeholder 8"/>
+          <p:cNvSpPr>
+            <a:spLocks noGrp="1"/>
+          </p:cNvSpPr>
+          <p:nvPr>
+            <p:ph type="sldNum" sz="quarter" idx="12"/>
+          </p:nvPr>
+        </p:nvSpPr>
+        <p:spPr>
+          <a:xfrm>
+            <a:off x="7800476" y="5956136"/>
+            <a:ext cx="770468" cy="365125"/>
+          </a:xfrm>
+          <a:prstGeom prst="rect">
+            <a:avLst/>
+          </a:prstGeom>
+        </p:spPr>
+        <p:txBody>
+          <a:bodyPr/>
+          <a:lstStyle/>
+          <a:p>
+            <a:fld id="{BBD74847-7BE4-4E4D-8159-51DF7B93C616}" type="slidenum">
+              <a:rPr lang="en-US" smtClean="0"/>
+              <a:t>‹#›</a:t>
+            </a:fld>
+            <a:endParaRPr lang="en-US"/>
+          </a:p>
+        </p:txBody>
+      </p:sp>
+      <p:sp>
+        <p:nvSpPr>
+          <p:cNvPr id="14" name="Rectangle 13">
+            <a:extLst>
+              <a:ext uri="{FF2B5EF4-FFF2-40B4-BE49-F238E27FC236}">
+                <a16:creationId xmlns:a16="http://schemas.microsoft.com/office/drawing/2014/main" id="{4E7E6853-34E8-4052-808F-422B5860D591}"/>
+              </a:ext>
+            </a:extLst>
+          </p:cNvPr>
+          <p:cNvSpPr>
+            <a:spLocks noChangeAspect="1"/>
+          </p:cNvSpPr>
+          <p:nvPr/>
+        </p:nvSpPr>
+        <p:spPr>
+          <a:xfrm>
+            <a:off x="142200" y="249101"/>
+            <a:ext cx="8831579" cy="840455"/>
+          </a:xfrm>
+          <a:prstGeom prst="rect">
+            <a:avLst/>
+          </a:prstGeom>
+          <a:solidFill>
+            <a:schemeClr val="accent1"/>
+          </a:solidFill>
+          <a:ln>
+            <a:noFill/>
+          </a:ln>
+          <a:effectLst/>
+        </p:spPr>
+        <p:style>
+          <a:lnRef idx="1">
+            <a:schemeClr val="accent1"/>
+          </a:lnRef>
+          <a:fillRef idx="3">
+            <a:schemeClr val="accent1"/>
+          </a:fillRef>
+          <a:effectRef idx="2">
+            <a:schemeClr val="accent1"/>
+          </a:effectRef>
+          <a:fontRef idx="minor">
+            <a:schemeClr val="lt1"/>
+          </a:fontRef>
+        </p:style>
+        <p:txBody>
+          <a:bodyPr/>
+          <a:lstStyle/>
+          <a:p>
+            <a:endParaRPr lang="en-US" dirty="0"/>
+          </a:p>
+        </p:txBody>
+      </p:sp>
+      <p:sp>
+        <p:nvSpPr>
+          <p:cNvPr id="15" name="Title 1">
+            <a:extLst>
+              <a:ext uri="{FF2B5EF4-FFF2-40B4-BE49-F238E27FC236}">
+                <a16:creationId xmlns:a16="http://schemas.microsoft.com/office/drawing/2014/main" id="{0EFA1566-CE68-450F-950A-CED460092EA8}"/>
+              </a:ext>
+            </a:extLst>
+          </p:cNvPr>
+          <p:cNvSpPr>
+            <a:spLocks noGrp="1"/>
+          </p:cNvSpPr>
+          <p:nvPr>
+            <p:ph type="title"/>
+          </p:nvPr>
+        </p:nvSpPr>
+        <p:spPr>
+          <a:xfrm>
+            <a:off x="175260" y="292975"/>
+            <a:ext cx="8746864" cy="752706"/>
+          </a:xfrm>
+        </p:spPr>
+        <p:txBody>
+          <a:bodyPr anchor="t"/>
+          <a:lstStyle>
+            <a:lvl1pPr>
+              <a:defRPr>
+                <a:solidFill>
+                  <a:schemeClr val="tx1"/>
+                </a:solidFill>
+              </a:defRPr>
+            </a:lvl1pPr>
+          </a:lstStyle>
+          <a:p>
+            <a:r>
+              <a:rPr lang="en-US"/>
+              <a:t>Click to edit Master title style</a:t>
+            </a:r>
+            <a:endParaRPr lang="en-US" dirty="0"/>
+          </a:p>
+        </p:txBody>
+      </p:sp>
+      <p:sp>
+        <p:nvSpPr>
+          <p:cNvPr id="11" name="Rectangle 10">
+            <a:extLst>
+              <a:ext uri="{FF2B5EF4-FFF2-40B4-BE49-F238E27FC236}">
+                <a16:creationId xmlns:a16="http://schemas.microsoft.com/office/drawing/2014/main" id="{174300F3-FE7D-764A-BA65-9EB3F150FBC3}"/>
+              </a:ext>
+            </a:extLst>
+          </p:cNvPr>
+          <p:cNvSpPr>
+            <a:spLocks noChangeAspect="1"/>
+          </p:cNvSpPr>
+          <p:nvPr userDrawn="1"/>
+        </p:nvSpPr>
+        <p:spPr>
+          <a:xfrm>
+            <a:off x="142200" y="249101"/>
+            <a:ext cx="8831579" cy="840455"/>
+          </a:xfrm>
+          <a:prstGeom prst="rect">
+            <a:avLst/>
+          </a:prstGeom>
+          <a:solidFill>
+            <a:schemeClr val="accent1"/>
+          </a:solidFill>
+          <a:ln>
+            <a:noFill/>
+          </a:ln>
+          <a:effectLst/>
+        </p:spPr>
+        <p:style>
+          <a:lnRef idx="1">
+            <a:schemeClr val="accent1"/>
+          </a:lnRef>
+          <a:fillRef idx="3">
+            <a:schemeClr val="accent1"/>
+          </a:fillRef>
+          <a:effectRef idx="2">
+            <a:schemeClr val="accent1"/>
+          </a:effectRef>
+          <a:fontRef idx="minor">
+            <a:schemeClr val="lt1"/>
+          </a:fontRef>
+        </p:style>
+        <p:txBody>
+          <a:bodyPr/>
+          <a:lstStyle/>
+          <a:p>
+            <a:endParaRPr lang="en-US" dirty="0"/>
+          </a:p>
+        </p:txBody>
+      </p:sp>
+    </p:spTree>
+    <p:extLst>
+      <p:ext uri="{BB962C8B-B14F-4D97-AF65-F5344CB8AC3E}">
+        <p14:creationId xmlns:p14="http://schemas.microsoft.com/office/powerpoint/2010/main" val="2913833102"/>
+      </p:ext>
+    </p:extLst>
+  </p:cSld>
+  <p:clrMapOvr>
+    <a:masterClrMapping/>
+  </p:clrMapOvr>
+</p:sldLayout>
+</file>
+
 <file path=ppt/slideLayouts/slideLayout6.xml><?xml version="1.0" encoding="utf-8"?>
-<p:sldLayout xmlns:a="http://schemas.openxmlformats.org/drawingml/2006/main" xmlns:r="http://schemas.openxmlformats.org/officeDocument/2006/relationships" xmlns:p="http://schemas.openxmlformats.org/presentationml/2006/main" preserve="1" userDrawn="1">
+<p:sldLayout xmlns:a="http://schemas.openxmlformats.org/drawingml/2006/main" xmlns:r="http://schemas.openxmlformats.org/officeDocument/2006/relationships" xmlns:p="http://schemas.openxmlformats.org/presentationml/2006/main" preserve="1">
   <p:cSld name="Title Only">
     <p:spTree>
       <p:nvGrpSpPr>
@@ -3624,7 +5372,7 @@
             </a:extLst>
           </p:cNvPr>
           <p:cNvCxnSpPr/>
-          <p:nvPr userDrawn="1"/>
+          <p:nvPr/>
         </p:nvCxnSpPr>
         <p:spPr>
           <a:xfrm>
@@ -3662,7 +5410,7 @@
           <p:cNvSpPr>
             <a:spLocks noChangeAspect="1"/>
           </p:cNvSpPr>
-          <p:nvPr userDrawn="1"/>
+          <p:nvPr/>
         </p:nvSpPr>
         <p:spPr>
           <a:xfrm>
@@ -3737,16 +5485,105 @@
           </a:lstStyle>
           <a:p>
             <a:r>
-              <a:rPr lang="en-US" dirty="0"/>
+              <a:rPr lang="en-US"/>
               <a:t>Click to edit Master title style</a:t>
             </a:r>
+            <a:endParaRPr lang="en-US" dirty="0"/>
+          </a:p>
+        </p:txBody>
+      </p:sp>
+      <p:cxnSp>
+        <p:nvCxnSpPr>
+          <p:cNvPr id="10" name="Straight Connector 9">
+            <a:extLst>
+              <a:ext uri="{FF2B5EF4-FFF2-40B4-BE49-F238E27FC236}">
+                <a16:creationId xmlns:a16="http://schemas.microsoft.com/office/drawing/2014/main" id="{98F7EB52-F0AC-1B47-997C-177369938B62}"/>
+              </a:ext>
+            </a:extLst>
+          </p:cNvPr>
+          <p:cNvCxnSpPr/>
+          <p:nvPr userDrawn="1"/>
+        </p:nvCxnSpPr>
+        <p:spPr>
+          <a:xfrm>
+            <a:off x="175260" y="6316935"/>
+            <a:ext cx="8831580" cy="0"/>
+          </a:xfrm>
+          <a:prstGeom prst="line">
+            <a:avLst/>
+          </a:prstGeom>
+        </p:spPr>
+        <p:style>
+          <a:lnRef idx="1">
+            <a:schemeClr val="dk1"/>
+          </a:lnRef>
+          <a:fillRef idx="0">
+            <a:schemeClr val="dk1"/>
+          </a:fillRef>
+          <a:effectRef idx="0">
+            <a:schemeClr val="dk1"/>
+          </a:effectRef>
+          <a:fontRef idx="minor">
+            <a:schemeClr val="tx1"/>
+          </a:fontRef>
+        </p:style>
+      </p:cxnSp>
+      <p:sp>
+        <p:nvSpPr>
+          <p:cNvPr id="11" name="Rectangle 10">
+            <a:extLst>
+              <a:ext uri="{FF2B5EF4-FFF2-40B4-BE49-F238E27FC236}">
+                <a16:creationId xmlns:a16="http://schemas.microsoft.com/office/drawing/2014/main" id="{D01225B1-8E03-E14B-B6CB-FA865DF95195}"/>
+              </a:ext>
+            </a:extLst>
+          </p:cNvPr>
+          <p:cNvSpPr>
+            <a:spLocks noChangeAspect="1"/>
+          </p:cNvSpPr>
+          <p:nvPr userDrawn="1"/>
+        </p:nvSpPr>
+        <p:spPr>
+          <a:xfrm>
+            <a:off x="142200" y="249101"/>
+            <a:ext cx="8831579" cy="840455"/>
+          </a:xfrm>
+          <a:prstGeom prst="rect">
+            <a:avLst/>
+          </a:prstGeom>
+          <a:solidFill>
+            <a:schemeClr val="accent1"/>
+          </a:solidFill>
+          <a:ln>
+            <a:noFill/>
+          </a:ln>
+          <a:effectLst/>
+        </p:spPr>
+        <p:style>
+          <a:lnRef idx="1">
+            <a:schemeClr val="accent1"/>
+          </a:lnRef>
+          <a:fillRef idx="3">
+            <a:schemeClr val="accent1"/>
+          </a:fillRef>
+          <a:effectRef idx="2">
+            <a:schemeClr val="accent1"/>
+          </a:effectRef>
+          <a:fontRef idx="minor">
+            <a:schemeClr val="lt1"/>
+          </a:fontRef>
+        </p:style>
+        <p:txBody>
+          <a:bodyPr/>
+          <a:lstStyle/>
+          <a:p>
+            <a:endParaRPr lang="en-US" dirty="0"/>
           </a:p>
         </p:txBody>
       </p:sp>
     </p:spTree>
     <p:extLst>
       <p:ext uri="{BB962C8B-B14F-4D97-AF65-F5344CB8AC3E}">
-        <p14:creationId xmlns:p14="http://schemas.microsoft.com/office/powerpoint/2010/main" val="997795342"/>
+        <p14:creationId xmlns:p14="http://schemas.microsoft.com/office/powerpoint/2010/main" val="3603204099"/>
       </p:ext>
     </p:extLst>
   </p:cSld>
@@ -3757,7 +5594,7 @@
 </file>
 
 <file path=ppt/slideLayouts/slideLayout7.xml><?xml version="1.0" encoding="utf-8"?>
-<p:sldLayout xmlns:a="http://schemas.openxmlformats.org/drawingml/2006/main" xmlns:r="http://schemas.openxmlformats.org/officeDocument/2006/relationships" xmlns:p="http://schemas.openxmlformats.org/presentationml/2006/main" preserve="1" userDrawn="1">
+<p:sldLayout xmlns:a="http://schemas.openxmlformats.org/drawingml/2006/main" xmlns:r="http://schemas.openxmlformats.org/officeDocument/2006/relationships" xmlns:p="http://schemas.openxmlformats.org/presentationml/2006/main" preserve="1">
   <p:cSld name="Blank">
     <p:spTree>
       <p:nvGrpSpPr>
@@ -3785,7 +5622,7 @@
           <p:cNvSpPr>
             <a:spLocks noChangeAspect="1"/>
           </p:cNvSpPr>
-          <p:nvPr userDrawn="1"/>
+          <p:nvPr/>
         </p:nvSpPr>
         <p:spPr>
           <a:xfrm>
@@ -3860,9 +5697,10 @@
           </a:lstStyle>
           <a:p>
             <a:r>
-              <a:rPr lang="en-US" dirty="0"/>
+              <a:rPr lang="en-US"/>
               <a:t>Click to edit Master title style</a:t>
             </a:r>
+            <a:endParaRPr lang="en-US" dirty="0"/>
           </a:p>
         </p:txBody>
       </p:sp>
@@ -3913,7 +5751,7 @@
             </a:extLst>
           </p:cNvPr>
           <p:cNvCxnSpPr/>
-          <p:nvPr userDrawn="1"/>
+          <p:nvPr/>
         </p:nvCxnSpPr>
         <p:spPr>
           <a:xfrm>
@@ -3976,10 +5814,98 @@
           </a:p>
         </p:txBody>
       </p:sp>
+      <p:sp>
+        <p:nvSpPr>
+          <p:cNvPr id="7" name="Rectangle 6">
+            <a:extLst>
+              <a:ext uri="{FF2B5EF4-FFF2-40B4-BE49-F238E27FC236}">
+                <a16:creationId xmlns:a16="http://schemas.microsoft.com/office/drawing/2014/main" id="{F7112F4E-93B5-5246-A22F-60DA388E6895}"/>
+              </a:ext>
+            </a:extLst>
+          </p:cNvPr>
+          <p:cNvSpPr>
+            <a:spLocks noChangeAspect="1"/>
+          </p:cNvSpPr>
+          <p:nvPr userDrawn="1"/>
+        </p:nvSpPr>
+        <p:spPr>
+          <a:xfrm>
+            <a:off x="142200" y="249101"/>
+            <a:ext cx="8831579" cy="840455"/>
+          </a:xfrm>
+          <a:prstGeom prst="rect">
+            <a:avLst/>
+          </a:prstGeom>
+          <a:solidFill>
+            <a:schemeClr val="accent1"/>
+          </a:solidFill>
+          <a:ln>
+            <a:noFill/>
+          </a:ln>
+          <a:effectLst/>
+        </p:spPr>
+        <p:style>
+          <a:lnRef idx="1">
+            <a:schemeClr val="accent1"/>
+          </a:lnRef>
+          <a:fillRef idx="3">
+            <a:schemeClr val="accent1"/>
+          </a:fillRef>
+          <a:effectRef idx="2">
+            <a:schemeClr val="accent1"/>
+          </a:effectRef>
+          <a:fontRef idx="minor">
+            <a:schemeClr val="lt1"/>
+          </a:fontRef>
+        </p:style>
+        <p:txBody>
+          <a:bodyPr/>
+          <a:lstStyle/>
+          <a:p>
+            <a:endParaRPr lang="en-US" dirty="0"/>
+          </a:p>
+        </p:txBody>
+      </p:sp>
+      <p:cxnSp>
+        <p:nvCxnSpPr>
+          <p:cNvPr id="13" name="Straight Connector 12">
+            <a:extLst>
+              <a:ext uri="{FF2B5EF4-FFF2-40B4-BE49-F238E27FC236}">
+                <a16:creationId xmlns:a16="http://schemas.microsoft.com/office/drawing/2014/main" id="{5FCBF0C8-D16D-D04B-8D2F-40E4D349103D}"/>
+              </a:ext>
+            </a:extLst>
+          </p:cNvPr>
+          <p:cNvCxnSpPr/>
+          <p:nvPr userDrawn="1"/>
+        </p:nvCxnSpPr>
+        <p:spPr>
+          <a:xfrm>
+            <a:off x="175260" y="6316935"/>
+            <a:ext cx="8831580" cy="0"/>
+          </a:xfrm>
+          <a:prstGeom prst="line">
+            <a:avLst/>
+          </a:prstGeom>
+        </p:spPr>
+        <p:style>
+          <a:lnRef idx="1">
+            <a:schemeClr val="dk1"/>
+          </a:lnRef>
+          <a:fillRef idx="0">
+            <a:schemeClr val="dk1"/>
+          </a:fillRef>
+          <a:effectRef idx="0">
+            <a:schemeClr val="dk1"/>
+          </a:effectRef>
+          <a:fontRef idx="minor">
+            <a:schemeClr val="tx1"/>
+          </a:fontRef>
+        </p:style>
+      </p:cxnSp>
     </p:spTree>
     <p:extLst>
       <p:ext uri="{BB962C8B-B14F-4D97-AF65-F5344CB8AC3E}">
-        <p14:creationId xmlns:p14="http://schemas.microsoft.com/office/powerpoint/2010/main" val="2961518194"/>
+        <p14:creationId xmlns:p14="http://schemas.microsoft.com/office/powerpoint/2010/main" val="3476774955"/>
       </p:ext>
     </p:extLst>
   </p:cSld>
@@ -4402,7 +6328,7 @@
     </p:spTree>
     <p:extLst>
       <p:ext uri="{BB962C8B-B14F-4D97-AF65-F5344CB8AC3E}">
-        <p14:creationId xmlns:p14="http://schemas.microsoft.com/office/powerpoint/2010/main" val="4019911693"/>
+        <p14:creationId xmlns:p14="http://schemas.microsoft.com/office/powerpoint/2010/main" val="3566238808"/>
       </p:ext>
     </p:extLst>
   </p:cSld>
@@ -4693,7 +6619,7 @@
     </p:spTree>
     <p:extLst>
       <p:ext uri="{BB962C8B-B14F-4D97-AF65-F5344CB8AC3E}">
-        <p14:creationId xmlns:p14="http://schemas.microsoft.com/office/powerpoint/2010/main" val="2749694223"/>
+        <p14:creationId xmlns:p14="http://schemas.microsoft.com/office/powerpoint/2010/main" val="2413978389"/>
       </p:ext>
     </p:extLst>
   </p:cSld>
@@ -4751,9 +6677,10 @@
           <a:lstStyle/>
           <a:p>
             <a:r>
-              <a:rPr lang="en-US" dirty="0"/>
+              <a:rPr lang="en-US"/>
               <a:t>Click to edit Master title style</a:t>
             </a:r>
+            <a:endParaRPr lang="en-US" dirty="0"/>
           </a:p>
         </p:txBody>
       </p:sp>
@@ -4784,37 +6711,38 @@
           <a:p>
             <a:pPr lvl="0"/>
             <a:r>
-              <a:rPr lang="en-US" dirty="0"/>
+              <a:rPr lang="en-US"/>
               <a:t>Click to edit Master text styles</a:t>
             </a:r>
           </a:p>
           <a:p>
             <a:pPr lvl="1"/>
             <a:r>
-              <a:rPr lang="en-US" dirty="0"/>
+              <a:rPr lang="en-US"/>
               <a:t>Second level</a:t>
             </a:r>
           </a:p>
           <a:p>
             <a:pPr lvl="2"/>
             <a:r>
-              <a:rPr lang="en-US" dirty="0"/>
+              <a:rPr lang="en-US"/>
               <a:t>Third level</a:t>
             </a:r>
           </a:p>
           <a:p>
             <a:pPr lvl="3"/>
             <a:r>
-              <a:rPr lang="en-US" dirty="0"/>
+              <a:rPr lang="en-US"/>
               <a:t>Fourth level</a:t>
             </a:r>
           </a:p>
           <a:p>
             <a:pPr lvl="4"/>
             <a:r>
-              <a:rPr lang="en-US" dirty="0"/>
+              <a:rPr lang="en-US"/>
               <a:t>Fifth level</a:t>
             </a:r>
+            <a:endParaRPr lang="en-US" dirty="0"/>
           </a:p>
         </p:txBody>
       </p:sp>
@@ -4833,7 +6761,7 @@
             <a:avLst/>
           </a:prstGeom>
           <a:solidFill>
-            <a:srgbClr val="65D7FF"/>
+            <a:schemeClr val="tx1"/>
           </a:solidFill>
           <a:ln>
             <a:noFill/>
@@ -4877,7 +6805,7 @@
             <a:avLst/>
           </a:prstGeom>
           <a:solidFill>
-            <a:srgbClr val="FFD500"/>
+            <a:srgbClr val="0EAE9F"/>
           </a:solidFill>
           <a:ln>
             <a:noFill/>
@@ -4914,7 +6842,7 @@
             <a:avLst/>
           </a:prstGeom>
           <a:solidFill>
-            <a:srgbClr val="961BDB"/>
+            <a:srgbClr val="FFD500"/>
           </a:solidFill>
           <a:ln>
             <a:noFill/>
@@ -4955,7 +6883,7 @@
         <p:spPr>
           <a:xfrm>
             <a:off x="88409" y="6266485"/>
-            <a:ext cx="4870585" cy="365125"/>
+            <a:ext cx="7599835" cy="365125"/>
           </a:xfrm>
           <a:prstGeom prst="rect">
             <a:avLst/>
@@ -5025,6 +6953,42 @@
             <a:extLst>
               <a:ext uri="{FF2B5EF4-FFF2-40B4-BE49-F238E27FC236}">
                 <a16:creationId xmlns:a16="http://schemas.microsoft.com/office/drawing/2014/main" id="{6AF90A68-628C-4E8F-BCF5-404070DD47EC}"/>
+              </a:ext>
+            </a:extLst>
+          </p:cNvPr>
+          <p:cNvCxnSpPr/>
+          <p:nvPr/>
+        </p:nvCxnSpPr>
+        <p:spPr>
+          <a:xfrm>
+            <a:off x="175260" y="6316935"/>
+            <a:ext cx="8831580" cy="0"/>
+          </a:xfrm>
+          <a:prstGeom prst="line">
+            <a:avLst/>
+          </a:prstGeom>
+        </p:spPr>
+        <p:style>
+          <a:lnRef idx="1">
+            <a:schemeClr val="dk1"/>
+          </a:lnRef>
+          <a:fillRef idx="0">
+            <a:schemeClr val="dk1"/>
+          </a:fillRef>
+          <a:effectRef idx="0">
+            <a:schemeClr val="dk1"/>
+          </a:effectRef>
+          <a:fontRef idx="minor">
+            <a:schemeClr val="tx1"/>
+          </a:fontRef>
+        </p:style>
+      </p:cxnSp>
+      <p:cxnSp>
+        <p:nvCxnSpPr>
+          <p:cNvPr id="15" name="Straight Connector 14">
+            <a:extLst>
+              <a:ext uri="{FF2B5EF4-FFF2-40B4-BE49-F238E27FC236}">
+                <a16:creationId xmlns:a16="http://schemas.microsoft.com/office/drawing/2014/main" id="{C80D830A-DB75-3B4C-A789-5A5D51D68A14}"/>
               </a:ext>
             </a:extLst>
           </p:cNvPr>
@@ -5058,23 +7022,27 @@
     </p:spTree>
     <p:extLst>
       <p:ext uri="{BB962C8B-B14F-4D97-AF65-F5344CB8AC3E}">
-        <p14:creationId xmlns:p14="http://schemas.microsoft.com/office/powerpoint/2010/main" val="3144911534"/>
+        <p14:creationId xmlns:p14="http://schemas.microsoft.com/office/powerpoint/2010/main" val="4135352055"/>
       </p:ext>
     </p:extLst>
   </p:cSld>
   <p:clrMap bg1="lt1" tx1="dk1" bg2="lt2" tx2="dk2" accent1="accent1" accent2="accent2" accent3="accent3" accent4="accent4" accent5="accent5" accent6="accent6" hlink="hlink" folHlink="folHlink"/>
   <p:sldLayoutIdLst>
-    <p:sldLayoutId id="2147483762" r:id="rId1"/>
-    <p:sldLayoutId id="2147483763" r:id="rId2"/>
-    <p:sldLayoutId id="2147483764" r:id="rId3"/>
-    <p:sldLayoutId id="2147483765" r:id="rId4"/>
-    <p:sldLayoutId id="2147483766" r:id="rId5"/>
-    <p:sldLayoutId id="2147483767" r:id="rId6"/>
-    <p:sldLayoutId id="2147483768" r:id="rId7"/>
-    <p:sldLayoutId id="2147483769" r:id="rId8"/>
-    <p:sldLayoutId id="2147483770" r:id="rId9"/>
-    <p:sldLayoutId id="2147483771" r:id="rId10"/>
-    <p:sldLayoutId id="2147483772" r:id="rId11"/>
+    <p:sldLayoutId id="2147483774" r:id="rId1"/>
+    <p:sldLayoutId id="2147483775" r:id="rId2"/>
+    <p:sldLayoutId id="2147483776" r:id="rId3"/>
+    <p:sldLayoutId id="2147483777" r:id="rId4"/>
+    <p:sldLayoutId id="2147483778" r:id="rId5"/>
+    <p:sldLayoutId id="2147483779" r:id="rId6"/>
+    <p:sldLayoutId id="2147483780" r:id="rId7"/>
+    <p:sldLayoutId id="2147483781" r:id="rId8"/>
+    <p:sldLayoutId id="2147483782" r:id="rId9"/>
+    <p:sldLayoutId id="2147483783" r:id="rId10"/>
+    <p:sldLayoutId id="2147483784" r:id="rId11"/>
+    <p:sldLayoutId id="2147483765" r:id="rId12"/>
+    <p:sldLayoutId id="2147483766" r:id="rId13"/>
+    <p:sldLayoutId id="2147483767" r:id="rId14"/>
+    <p:sldLayoutId id="2147483768" r:id="rId15"/>
   </p:sldLayoutIdLst>
   <p:hf hdr="0" dt="0"/>
   <p:txStyles>
@@ -5605,6 +7573,12 @@
               <a:t>Learn how to use the Wait Until Block</a:t>
             </a:r>
           </a:p>
+          <a:p>
+            <a:r>
+              <a:rPr lang="en-US" dirty="0"/>
+              <a:t>Note:  Although images in this lessons may show a SPIKE Prime, the code blocks are the same for Robot Inventor</a:t>
+            </a:r>
+          </a:p>
         </p:txBody>
       </p:sp>
       <p:sp>
@@ -5819,8 +7793,8 @@
         </p:nvSpPr>
         <p:spPr>
           <a:xfrm>
-            <a:off x="155088" y="1140006"/>
-            <a:ext cx="4984803" cy="5082601"/>
+            <a:off x="155089" y="1140006"/>
+            <a:ext cx="4416912" cy="5082601"/>
           </a:xfrm>
           <a:prstGeom prst="rect">
             <a:avLst/>
@@ -6045,7 +8019,7 @@
           <a:p>
             <a:r>
               <a:rPr lang="en-US" dirty="0"/>
-              <a:t>The sensor can detect 8 colors and no color</a:t>
+              <a:t>The sensor can detect 8 colors and no color (what those colors are vary between SPIKE Prime and Robot Inventor)</a:t>
             </a:r>
           </a:p>
           <a:p>
@@ -6056,6 +8030,12 @@
           </a:p>
           <a:p>
             <a:endParaRPr lang="en-US" dirty="0"/>
+          </a:p>
+          <a:p>
+            <a:r>
+              <a:rPr lang="en-US" dirty="0"/>
+              <a:t>Note: In Robot Inventor, the light blue color is replaced with teal </a:t>
+            </a:r>
           </a:p>
         </p:txBody>
       </p:sp>
@@ -6073,7 +8053,7 @@
         </p:nvSpPr>
         <p:spPr>
           <a:xfrm>
-            <a:off x="6092793" y="1323446"/>
+            <a:off x="7141450" y="1354688"/>
             <a:ext cx="1780674" cy="2160124"/>
           </a:xfrm>
           <a:prstGeom prst="rect">
@@ -6222,7 +8202,7 @@
         </p:blipFill>
         <p:spPr>
           <a:xfrm>
-            <a:off x="5883096" y="3681306"/>
+            <a:off x="4788174" y="1271298"/>
             <a:ext cx="2353276" cy="2326904"/>
           </a:xfrm>
           <a:prstGeom prst="rect">
@@ -6230,6 +8210,177 @@
           </a:prstGeom>
         </p:spPr>
       </p:pic>
+      <p:pic>
+        <p:nvPicPr>
+          <p:cNvPr id="8" name="Picture 7">
+            <a:extLst>
+              <a:ext uri="{FF2B5EF4-FFF2-40B4-BE49-F238E27FC236}">
+                <a16:creationId xmlns:a16="http://schemas.microsoft.com/office/drawing/2014/main" id="{DF6AA2B2-01C2-2D44-AFBE-8D69C55C1339}"/>
+              </a:ext>
+            </a:extLst>
+          </p:cNvPr>
+          <p:cNvPicPr>
+            <a:picLocks noChangeAspect="1"/>
+          </p:cNvPicPr>
+          <p:nvPr/>
+        </p:nvPicPr>
+        <p:blipFill rotWithShape="1">
+          <a:blip r:embed="rId3"/>
+          <a:srcRect l="26945" t="19423"/>
+          <a:stretch/>
+        </p:blipFill>
+        <p:spPr>
+          <a:xfrm>
+            <a:off x="4898201" y="3912243"/>
+            <a:ext cx="2154700" cy="2225815"/>
+          </a:xfrm>
+          <a:prstGeom prst="rect">
+            <a:avLst/>
+          </a:prstGeom>
+        </p:spPr>
+      </p:pic>
+      <p:sp>
+        <p:nvSpPr>
+          <p:cNvPr id="10" name="Rectangle 9">
+            <a:extLst>
+              <a:ext uri="{FF2B5EF4-FFF2-40B4-BE49-F238E27FC236}">
+                <a16:creationId xmlns:a16="http://schemas.microsoft.com/office/drawing/2014/main" id="{593C6A77-13C9-0647-B0C8-D2BED5941794}"/>
+              </a:ext>
+            </a:extLst>
+          </p:cNvPr>
+          <p:cNvSpPr/>
+          <p:nvPr/>
+        </p:nvSpPr>
+        <p:spPr>
+          <a:xfrm>
+            <a:off x="7141450" y="3912243"/>
+            <a:ext cx="1780674" cy="2160124"/>
+          </a:xfrm>
+          <a:prstGeom prst="rect">
+            <a:avLst/>
+          </a:prstGeom>
+        </p:spPr>
+        <p:style>
+          <a:lnRef idx="2">
+            <a:schemeClr val="accent1">
+              <a:shade val="50000"/>
+            </a:schemeClr>
+          </a:lnRef>
+          <a:fillRef idx="1">
+            <a:schemeClr val="accent1"/>
+          </a:fillRef>
+          <a:effectRef idx="0">
+            <a:schemeClr val="accent1"/>
+          </a:effectRef>
+          <a:fontRef idx="minor">
+            <a:schemeClr val="lt1"/>
+          </a:fontRef>
+        </p:style>
+        <p:txBody>
+          <a:bodyPr rtlCol="0" anchor="ctr"/>
+          <a:lstStyle/>
+          <a:p>
+            <a:r>
+              <a:rPr lang="en-US" sz="1400" u="sng" dirty="0">
+                <a:solidFill>
+                  <a:schemeClr val="tx1"/>
+                </a:solidFill>
+              </a:rPr>
+              <a:t>Detectable Colors</a:t>
+            </a:r>
+          </a:p>
+          <a:p>
+            <a:r>
+              <a:rPr lang="en-US" sz="1400" dirty="0">
+                <a:solidFill>
+                  <a:schemeClr val="tx1"/>
+                </a:solidFill>
+              </a:rPr>
+              <a:t>Black (0)</a:t>
+            </a:r>
+          </a:p>
+          <a:p>
+            <a:r>
+              <a:rPr lang="en-US" sz="1400" dirty="0">
+                <a:solidFill>
+                  <a:schemeClr val="tx1"/>
+                </a:solidFill>
+              </a:rPr>
+              <a:t>Violet (1)</a:t>
+            </a:r>
+          </a:p>
+          <a:p>
+            <a:r>
+              <a:rPr lang="en-US" sz="1400" dirty="0">
+                <a:solidFill>
+                  <a:schemeClr val="tx1"/>
+                </a:solidFill>
+              </a:rPr>
+              <a:t>Blue (3)</a:t>
+            </a:r>
+          </a:p>
+          <a:p>
+            <a:r>
+              <a:rPr lang="en-US" sz="1400" dirty="0">
+                <a:solidFill>
+                  <a:schemeClr val="tx1"/>
+                </a:solidFill>
+              </a:rPr>
+              <a:t>Teal (4)</a:t>
+            </a:r>
+          </a:p>
+          <a:p>
+            <a:r>
+              <a:rPr lang="en-US" sz="1400" dirty="0">
+                <a:solidFill>
+                  <a:schemeClr val="tx1"/>
+                </a:solidFill>
+              </a:rPr>
+              <a:t>Green (5)</a:t>
+            </a:r>
+          </a:p>
+          <a:p>
+            <a:r>
+              <a:rPr lang="en-US" sz="1400" dirty="0">
+                <a:solidFill>
+                  <a:schemeClr val="tx1"/>
+                </a:solidFill>
+              </a:rPr>
+              <a:t>Yellow (7)</a:t>
+            </a:r>
+          </a:p>
+          <a:p>
+            <a:r>
+              <a:rPr lang="en-US" sz="1400" dirty="0">
+                <a:solidFill>
+                  <a:schemeClr val="tx1"/>
+                </a:solidFill>
+              </a:rPr>
+              <a:t>Red (9)</a:t>
+            </a:r>
+          </a:p>
+          <a:p>
+            <a:r>
+              <a:rPr lang="en-US" sz="1400" dirty="0">
+                <a:solidFill>
+                  <a:schemeClr val="tx1"/>
+                </a:solidFill>
+              </a:rPr>
+              <a:t>White (10)</a:t>
+            </a:r>
+          </a:p>
+          <a:p>
+            <a:r>
+              <a:rPr lang="en-US" sz="1400" dirty="0">
+                <a:solidFill>
+                  <a:schemeClr val="tx1"/>
+                </a:solidFill>
+              </a:rPr>
+              <a:t>No Color (-1)</a:t>
+            </a:r>
+          </a:p>
+        </p:txBody>
+      </p:sp>
     </p:spTree>
     <p:extLst>
       <p:ext uri="{BB962C8B-B14F-4D97-AF65-F5344CB8AC3E}">
@@ -6290,6 +8441,52 @@
       </p:sp>
       <p:sp>
         <p:nvSpPr>
+          <p:cNvPr id="9" name="Content Placeholder 8">
+            <a:extLst>
+              <a:ext uri="{FF2B5EF4-FFF2-40B4-BE49-F238E27FC236}">
+                <a16:creationId xmlns:a16="http://schemas.microsoft.com/office/drawing/2014/main" id="{E68F8AD0-0360-C948-9835-941AA7232868}"/>
+              </a:ext>
+            </a:extLst>
+          </p:cNvPr>
+          <p:cNvSpPr>
+            <a:spLocks noGrp="1"/>
+          </p:cNvSpPr>
+          <p:nvPr>
+            <p:ph idx="1"/>
+          </p:nvPr>
+        </p:nvSpPr>
+        <p:spPr>
+          <a:xfrm>
+            <a:off x="155088" y="1140006"/>
+            <a:ext cx="4803906" cy="5082601"/>
+          </a:xfrm>
+        </p:spPr>
+        <p:txBody>
+          <a:bodyPr/>
+          <a:lstStyle/>
+          <a:p>
+            <a:r>
+              <a:rPr lang="en-US" i="1" dirty="0"/>
+              <a:t>The color sensor on ADB (Advanced Driving Base in SPIKE Prime) is mounted at about 8mm off the ground, but the optimal distance for mounting the sensor according to the specs is 16mm.</a:t>
+            </a:r>
+          </a:p>
+          <a:p>
+            <a:r>
+              <a:rPr lang="en-US" dirty="0"/>
+              <a:t>When using this robot design, Black does not read correctly in Color Mode using electrical tape lines or a FIRST LEGO League challenge mat.</a:t>
+            </a:r>
+            <a:endParaRPr lang="en-US" i="1" dirty="0"/>
+          </a:p>
+          <a:p>
+            <a:r>
+              <a:rPr lang="en-US" dirty="0"/>
+              <a:t>See the next slide for modifications. The build instructions are also provided as a separate file on our site.</a:t>
+            </a:r>
+          </a:p>
+        </p:txBody>
+      </p:sp>
+      <p:sp>
+        <p:nvSpPr>
           <p:cNvPr id="4" name="Footer Placeholder 3">
             <a:extLst>
               <a:ext uri="{FF2B5EF4-FFF2-40B4-BE49-F238E27FC236}">
@@ -6343,52 +8540,6 @@
               <a:t>4</a:t>
             </a:fld>
             <a:endParaRPr lang="en-US"/>
-          </a:p>
-        </p:txBody>
-      </p:sp>
-      <p:sp>
-        <p:nvSpPr>
-          <p:cNvPr id="9" name="Content Placeholder 8">
-            <a:extLst>
-              <a:ext uri="{FF2B5EF4-FFF2-40B4-BE49-F238E27FC236}">
-                <a16:creationId xmlns:a16="http://schemas.microsoft.com/office/drawing/2014/main" id="{E68F8AD0-0360-C948-9835-941AA7232868}"/>
-              </a:ext>
-            </a:extLst>
-          </p:cNvPr>
-          <p:cNvSpPr>
-            <a:spLocks noGrp="1"/>
-          </p:cNvSpPr>
-          <p:nvPr>
-            <p:ph idx="1"/>
-          </p:nvPr>
-        </p:nvSpPr>
-        <p:spPr>
-          <a:xfrm>
-            <a:off x="155088" y="1140006"/>
-            <a:ext cx="4803906" cy="5082601"/>
-          </a:xfrm>
-        </p:spPr>
-        <p:txBody>
-          <a:bodyPr/>
-          <a:lstStyle/>
-          <a:p>
-            <a:r>
-              <a:rPr lang="en-US" i="1" dirty="0"/>
-              <a:t>The color sensor on ADB is mounted at about 8mm off the ground, but the optimal distance for mounting the sensor according to the specs is 16mm.</a:t>
-            </a:r>
-          </a:p>
-          <a:p>
-            <a:r>
-              <a:rPr lang="en-US" dirty="0"/>
-              <a:t>When using this robot design, Black does not read correctly in Color Mode using electrical tape lines or a FIRST LEGO League challenge mat.</a:t>
-            </a:r>
-            <a:endParaRPr lang="en-US" i="1" dirty="0"/>
-          </a:p>
-          <a:p>
-            <a:r>
-              <a:rPr lang="en-US" dirty="0"/>
-              <a:t>See the next slide for modifications. The build instructions are also provided as a separate file on our site.</a:t>
-            </a:r>
           </a:p>
         </p:txBody>
       </p:sp>
@@ -7229,8 +9380,38 @@
         </p:blipFill>
         <p:spPr>
           <a:xfrm>
-            <a:off x="4326032" y="2428871"/>
-            <a:ext cx="3540012" cy="2468580"/>
+            <a:off x="5270978" y="1782165"/>
+            <a:ext cx="2607203" cy="1818098"/>
+          </a:xfrm>
+          <a:prstGeom prst="rect">
+            <a:avLst/>
+          </a:prstGeom>
+        </p:spPr>
+      </p:pic>
+      <p:pic>
+        <p:nvPicPr>
+          <p:cNvPr id="6" name="Picture 5">
+            <a:extLst>
+              <a:ext uri="{FF2B5EF4-FFF2-40B4-BE49-F238E27FC236}">
+                <a16:creationId xmlns:a16="http://schemas.microsoft.com/office/drawing/2014/main" id="{8F70D80A-D8C3-924E-A196-149297976415}"/>
+              </a:ext>
+            </a:extLst>
+          </p:cNvPr>
+          <p:cNvPicPr>
+            <a:picLocks noChangeAspect="1"/>
+          </p:cNvPicPr>
+          <p:nvPr/>
+        </p:nvPicPr>
+        <p:blipFill>
+          <a:blip r:embed="rId4"/>
+          <a:stretch>
+            <a:fillRect/>
+          </a:stretch>
+        </p:blipFill>
+        <p:spPr>
+          <a:xfrm>
+            <a:off x="5416952" y="4014751"/>
+            <a:ext cx="2315257" cy="2168394"/>
           </a:xfrm>
           <a:prstGeom prst="rect">
             <a:avLst/>
@@ -7908,6 +10089,35 @@
       </p:sp>
       <p:sp>
         <p:nvSpPr>
+          <p:cNvPr id="7" name="Slide Number Placeholder 6">
+            <a:extLst>
+              <a:ext uri="{FF2B5EF4-FFF2-40B4-BE49-F238E27FC236}">
+                <a16:creationId xmlns:a16="http://schemas.microsoft.com/office/drawing/2014/main" id="{F6739919-47A8-43E0-85A2-F648492C26DE}"/>
+              </a:ext>
+            </a:extLst>
+          </p:cNvPr>
+          <p:cNvSpPr>
+            <a:spLocks noGrp="1"/>
+          </p:cNvSpPr>
+          <p:nvPr>
+            <p:ph type="sldNum" sz="quarter" idx="12"/>
+          </p:nvPr>
+        </p:nvSpPr>
+        <p:spPr/>
+        <p:txBody>
+          <a:bodyPr/>
+          <a:lstStyle/>
+          <a:p>
+            <a:fld id="{BBD74847-7BE4-4E4D-8159-51DF7B93C616}" type="slidenum">
+              <a:rPr lang="en-US" smtClean="0"/>
+              <a:t>9</a:t>
+            </a:fld>
+            <a:endParaRPr lang="en-US"/>
+          </a:p>
+        </p:txBody>
+      </p:sp>
+      <p:sp>
+        <p:nvSpPr>
           <p:cNvPr id="5" name="Rectangle 4"/>
           <p:cNvSpPr>
             <a:spLocks noChangeArrowheads="1"/>
@@ -7931,7 +10141,7 @@
           <a:effectLst/>
           <a:extLst>
             <a:ext uri="{91240B29-F687-4f45-9708-019B960494DF}">
-              <a14:hiddenLine xmlns="" xmlns:a14="http://schemas.microsoft.com/office/drawing/2010/main" w="9525">
+              <a14:hiddenLine xmlns:a14="http://schemas.microsoft.com/office/drawing/2010/main" xmlns="" w="9525">
                 <a:solidFill>
                   <a:schemeClr val="tx1"/>
                 </a:solidFill>
@@ -7941,7 +10151,7 @@
               </a14:hiddenLine>
             </a:ext>
             <a:ext uri="{AF507438-7753-43e0-B8FC-AC1667EBCBE1}">
-              <a14:hiddenEffects xmlns="" xmlns:a14="http://schemas.microsoft.com/office/drawing/2010/main">
+              <a14:hiddenEffects xmlns:a14="http://schemas.microsoft.com/office/drawing/2010/main" xmlns="">
                 <a:effectLst>
                   <a:outerShdw dist="35921" dir="2700000" algn="ctr" rotWithShape="0">
                     <a:schemeClr val="bg2"/>
@@ -8282,7 +10492,7 @@
           <a:noFill/>
           <a:extLst>
             <a:ext uri="{909E8E84-426E-40dd-AFC4-6F175D3DCCD1}">
-              <a14:hiddenFill xmlns="" xmlns:a14="http://schemas.microsoft.com/office/drawing/2010/main">
+              <a14:hiddenFill xmlns:a14="http://schemas.microsoft.com/office/drawing/2010/main" xmlns="">
                 <a:solidFill>
                   <a:srgbClr val="FFFFFF"/>
                 </a:solidFill>
@@ -8291,35 +10501,6 @@
           </a:extLst>
         </p:spPr>
       </p:pic>
-      <p:sp>
-        <p:nvSpPr>
-          <p:cNvPr id="7" name="Slide Number Placeholder 6">
-            <a:extLst>
-              <a:ext uri="{FF2B5EF4-FFF2-40B4-BE49-F238E27FC236}">
-                <a16:creationId xmlns:a16="http://schemas.microsoft.com/office/drawing/2014/main" id="{F6739919-47A8-43E0-85A2-F648492C26DE}"/>
-              </a:ext>
-            </a:extLst>
-          </p:cNvPr>
-          <p:cNvSpPr>
-            <a:spLocks noGrp="1"/>
-          </p:cNvSpPr>
-          <p:nvPr>
-            <p:ph type="sldNum" sz="quarter" idx="12"/>
-          </p:nvPr>
-        </p:nvSpPr>
-        <p:spPr/>
-        <p:txBody>
-          <a:bodyPr/>
-          <a:lstStyle/>
-          <a:p>
-            <a:fld id="{BBD74847-7BE4-4E4D-8159-51DF7B93C616}" type="slidenum">
-              <a:rPr lang="en-US" smtClean="0"/>
-              <a:t>9</a:t>
-            </a:fld>
-            <a:endParaRPr lang="en-US"/>
-          </a:p>
-        </p:txBody>
-      </p:sp>
     </p:spTree>
     <p:extLst>
       <p:ext uri="{BB962C8B-B14F-4D97-AF65-F5344CB8AC3E}">
@@ -8336,7 +10517,7 @@
 <file path=ppt/theme/theme1.xml><?xml version="1.0" encoding="utf-8"?>
 <a:theme xmlns:a="http://schemas.openxmlformats.org/drawingml/2006/main" name="Dividend">
   <a:themeElements>
-    <a:clrScheme name="Spike Prime Lessons">
+    <a:clrScheme name="Custom 1">
       <a:dk1>
         <a:srgbClr val="000000"/>
       </a:dk1>
@@ -8347,31 +10528,31 @@
         <a:srgbClr val="000000"/>
       </a:dk2>
       <a:lt2>
-        <a:srgbClr val="FFFFFF"/>
+        <a:srgbClr val="F8F8F8"/>
       </a:lt2>
       <a:accent1>
-        <a:srgbClr val="FFD500"/>
+        <a:srgbClr val="DDDDDD"/>
       </a:accent1>
       <a:accent2>
-        <a:srgbClr val="961BDB"/>
+        <a:srgbClr val="B2B2B2"/>
       </a:accent2>
       <a:accent3>
-        <a:srgbClr val="FF0000"/>
+        <a:srgbClr val="969696"/>
       </a:accent3>
       <a:accent4>
-        <a:srgbClr val="65D7FF"/>
+        <a:srgbClr val="000000"/>
       </a:accent4>
       <a:accent5>
-        <a:srgbClr val="5B9BD5"/>
+        <a:srgbClr val="5F5F5F"/>
       </a:accent5>
       <a:accent6>
-        <a:srgbClr val="70AD47"/>
+        <a:srgbClr val="4D4D4D"/>
       </a:accent6>
       <a:hlink>
-        <a:srgbClr val="961BDB"/>
+        <a:srgbClr val="5F5F5F"/>
       </a:hlink>
       <a:folHlink>
-        <a:srgbClr val="65D7FF"/>
+        <a:srgbClr val="919191"/>
       </a:folHlink>
     </a:clrScheme>
     <a:fontScheme name="Dividend">
@@ -8596,7 +10777,7 @@
   <a:extraClrSchemeLst/>
   <a:extLst>
     <a:ext uri="{05A4C25C-085E-4340-85A3-A5531E510DB2}">
-      <thm15:themeFamily xmlns:thm15="http://schemas.microsoft.com/office/thememl/2012/main" name="Spike Prime Template.potx" id="{C1D969FE-89B1-4BE4-BDFA-C32471023150}" vid="{4149DA99-3325-4DAE-8A1C-4D0296C099A1}"/>
+      <thm15:themeFamily xmlns:thm15="http://schemas.microsoft.com/office/thememl/2012/main" name="HowtoUse" id="{7DD8E111-BC3A-4444-A06C-BD4DCB2344B2}" vid="{5D8D2880-D206-C442-A283-BCAB763DE85D}"/>
     </a:ext>
   </a:extLst>
 </a:theme>

</xml_diff>